<commit_message>
add poster presentation template
</commit_message>
<xml_diff>
--- a/materials/poster/poster-fa.pptx
+++ b/materials/poster/poster-fa.pptx
@@ -286,7 +286,7 @@
           <a:p>
             <a:fld id="{8324406B-F6EF-4086-931F-D80CBBED250D}" type="datetimeFigureOut">
               <a:rPr lang="en-US" smtClean="0"/>
-              <a:t>5/21/2021</a:t>
+              <a:t>6/22/2021</a:t>
             </a:fld>
             <a:endParaRPr lang="en-US"/>
           </a:p>
@@ -456,7 +456,7 @@
           <a:p>
             <a:fld id="{8324406B-F6EF-4086-931F-D80CBBED250D}" type="datetimeFigureOut">
               <a:rPr lang="en-US" smtClean="0"/>
-              <a:t>5/21/2021</a:t>
+              <a:t>6/22/2021</a:t>
             </a:fld>
             <a:endParaRPr lang="en-US"/>
           </a:p>
@@ -636,7 +636,7 @@
           <a:p>
             <a:fld id="{8324406B-F6EF-4086-931F-D80CBBED250D}" type="datetimeFigureOut">
               <a:rPr lang="en-US" smtClean="0"/>
-              <a:t>5/21/2021</a:t>
+              <a:t>6/22/2021</a:t>
             </a:fld>
             <a:endParaRPr lang="en-US"/>
           </a:p>
@@ -806,7 +806,7 @@
           <a:p>
             <a:fld id="{8324406B-F6EF-4086-931F-D80CBBED250D}" type="datetimeFigureOut">
               <a:rPr lang="en-US" smtClean="0"/>
-              <a:t>5/21/2021</a:t>
+              <a:t>6/22/2021</a:t>
             </a:fld>
             <a:endParaRPr lang="en-US"/>
           </a:p>
@@ -1050,7 +1050,7 @@
           <a:p>
             <a:fld id="{8324406B-F6EF-4086-931F-D80CBBED250D}" type="datetimeFigureOut">
               <a:rPr lang="en-US" smtClean="0"/>
-              <a:t>5/21/2021</a:t>
+              <a:t>6/22/2021</a:t>
             </a:fld>
             <a:endParaRPr lang="en-US"/>
           </a:p>
@@ -1282,7 +1282,7 @@
           <a:p>
             <a:fld id="{8324406B-F6EF-4086-931F-D80CBBED250D}" type="datetimeFigureOut">
               <a:rPr lang="en-US" smtClean="0"/>
-              <a:t>5/21/2021</a:t>
+              <a:t>6/22/2021</a:t>
             </a:fld>
             <a:endParaRPr lang="en-US"/>
           </a:p>
@@ -1649,7 +1649,7 @@
           <a:p>
             <a:fld id="{8324406B-F6EF-4086-931F-D80CBBED250D}" type="datetimeFigureOut">
               <a:rPr lang="en-US" smtClean="0"/>
-              <a:t>5/21/2021</a:t>
+              <a:t>6/22/2021</a:t>
             </a:fld>
             <a:endParaRPr lang="en-US"/>
           </a:p>
@@ -1767,7 +1767,7 @@
           <a:p>
             <a:fld id="{8324406B-F6EF-4086-931F-D80CBBED250D}" type="datetimeFigureOut">
               <a:rPr lang="en-US" smtClean="0"/>
-              <a:t>5/21/2021</a:t>
+              <a:t>6/22/2021</a:t>
             </a:fld>
             <a:endParaRPr lang="en-US"/>
           </a:p>
@@ -1862,7 +1862,7 @@
           <a:p>
             <a:fld id="{8324406B-F6EF-4086-931F-D80CBBED250D}" type="datetimeFigureOut">
               <a:rPr lang="en-US" smtClean="0"/>
-              <a:t>5/21/2021</a:t>
+              <a:t>6/22/2021</a:t>
             </a:fld>
             <a:endParaRPr lang="en-US"/>
           </a:p>
@@ -2139,7 +2139,7 @@
           <a:p>
             <a:fld id="{8324406B-F6EF-4086-931F-D80CBBED250D}" type="datetimeFigureOut">
               <a:rPr lang="en-US" smtClean="0"/>
-              <a:t>5/21/2021</a:t>
+              <a:t>6/22/2021</a:t>
             </a:fld>
             <a:endParaRPr lang="en-US"/>
           </a:p>
@@ -2396,7 +2396,7 @@
           <a:p>
             <a:fld id="{8324406B-F6EF-4086-931F-D80CBBED250D}" type="datetimeFigureOut">
               <a:rPr lang="en-US" smtClean="0"/>
-              <a:t>5/21/2021</a:t>
+              <a:t>6/22/2021</a:t>
             </a:fld>
             <a:endParaRPr lang="en-US"/>
           </a:p>
@@ -2609,7 +2609,7 @@
           <a:p>
             <a:fld id="{8324406B-F6EF-4086-931F-D80CBBED250D}" type="datetimeFigureOut">
               <a:rPr lang="en-US" smtClean="0"/>
-              <a:t>5/21/2021</a:t>
+              <a:t>6/22/2021</a:t>
             </a:fld>
             <a:endParaRPr lang="en-US"/>
           </a:p>
@@ -3075,62 +3075,141 @@
           </a:p>
         </p:txBody>
       </p:sp>
-      <p:sp>
-        <p:nvSpPr>
-          <p:cNvPr id="5" name="TextBox 4"/>
-          <p:cNvSpPr txBox="1"/>
+      <p:grpSp>
+        <p:nvGrpSpPr>
+          <p:cNvPr id="29" name="Group 28"/>
+          <p:cNvGrpSpPr/>
           <p:nvPr/>
-        </p:nvSpPr>
-        <p:spPr>
+        </p:nvGrpSpPr>
+        <p:grpSpPr>
           <a:xfrm>
-            <a:off x="1408696" y="404452"/>
-            <a:ext cx="4057523" cy="646331"/>
+            <a:off x="232162" y="254479"/>
+            <a:ext cx="6396922" cy="1315631"/>
+            <a:chOff x="3449188" y="6789335"/>
+            <a:chExt cx="3224298" cy="768093"/>
           </a:xfrm>
-          <a:prstGeom prst="rect">
-            <a:avLst/>
-          </a:prstGeom>
-          <a:noFill/>
-        </p:spPr>
-        <p:txBody>
-          <a:bodyPr wrap="square" rtlCol="0">
-            <a:spAutoFit/>
-          </a:bodyPr>
-          <a:lstStyle/>
-          <a:p>
-            <a:pPr algn="ctr"/>
-            <a:r>
-              <a:rPr lang="fa-IR" b="1" dirty="0" smtClean="0">
+        </p:grpSpPr>
+        <p:sp>
+          <p:nvSpPr>
+            <p:cNvPr id="30" name="Rounded Rectangle 29"/>
+            <p:cNvSpPr/>
+            <p:nvPr/>
+          </p:nvSpPr>
+          <p:spPr>
+            <a:xfrm>
+              <a:off x="3449188" y="6789335"/>
+              <a:ext cx="3224298" cy="768093"/>
+            </a:xfrm>
+            <a:prstGeom prst="roundRect">
+              <a:avLst>
+                <a:gd name="adj" fmla="val 14495"/>
+              </a:avLst>
+            </a:prstGeom>
+            <a:solidFill>
+              <a:schemeClr val="accent3">
+                <a:lumMod val="20000"/>
+                <a:lumOff val="80000"/>
+              </a:schemeClr>
+            </a:solidFill>
+            <a:ln w="19050">
+              <a:solidFill>
+                <a:srgbClr val="C00000"/>
+              </a:solidFill>
+            </a:ln>
+          </p:spPr>
+          <p:style>
+            <a:lnRef idx="2">
+              <a:schemeClr val="accent1">
+                <a:shade val="50000"/>
+              </a:schemeClr>
+            </a:lnRef>
+            <a:fillRef idx="1">
+              <a:schemeClr val="accent1"/>
+            </a:fillRef>
+            <a:effectRef idx="0">
+              <a:schemeClr val="accent1"/>
+            </a:effectRef>
+            <a:fontRef idx="minor">
+              <a:schemeClr val="lt1"/>
+            </a:fontRef>
+          </p:style>
+          <p:txBody>
+            <a:bodyPr rtlCol="0" anchor="ctr"/>
+            <a:lstStyle/>
+            <a:p>
+              <a:pPr algn="ctr"/>
+              <a:endParaRPr lang="en-US" dirty="0">
+                <a:solidFill>
+                  <a:schemeClr val="tx1"/>
+                </a:solidFill>
+              </a:endParaRPr>
+            </a:p>
+          </p:txBody>
+        </p:sp>
+        <p:sp>
+          <p:nvSpPr>
+            <p:cNvPr id="31" name="TextBox 30"/>
+            <p:cNvSpPr txBox="1"/>
+            <p:nvPr/>
+          </p:nvSpPr>
+          <p:spPr>
+            <a:xfrm>
+              <a:off x="4249154" y="6854722"/>
+              <a:ext cx="2422936" cy="152733"/>
+            </a:xfrm>
+            <a:prstGeom prst="rect">
+              <a:avLst/>
+            </a:prstGeom>
+            <a:noFill/>
+          </p:spPr>
+          <p:txBody>
+            <a:bodyPr wrap="square" rtlCol="0">
+              <a:spAutoFit/>
+            </a:bodyPr>
+            <a:lstStyle/>
+            <a:p>
+              <a:pPr algn="ctr" rtl="1"/>
+              <a:r>
+                <a:rPr lang="fa-IR" sz="1100" b="1" dirty="0" smtClean="0">
+                  <a:solidFill>
+                    <a:srgbClr val="C00000"/>
+                  </a:solidFill>
+                  <a:latin typeface="XB Kayhan" panose="02000503080000020003" pitchFamily="2" charset="-78"/>
+                  <a:cs typeface="XB Kayhan" panose="02000503080000020003" pitchFamily="2" charset="-78"/>
+                </a:rPr>
+                <a:t>بیست و ششمین گردهمایی فیزیک ماده چگال</a:t>
+              </a:r>
+              <a:r>
+                <a:rPr lang="en-US" sz="1100" b="1" dirty="0" smtClean="0">
+                  <a:solidFill>
+                    <a:srgbClr val="C00000"/>
+                  </a:solidFill>
+                  <a:latin typeface="XB Kayhan" panose="02000503080000020003" pitchFamily="2" charset="-78"/>
+                  <a:cs typeface="XB Kayhan" panose="02000503080000020003" pitchFamily="2" charset="-78"/>
+                </a:rPr>
+                <a:t> </a:t>
+              </a:r>
+              <a:r>
+                <a:rPr lang="fa-IR" sz="1100" b="1" dirty="0" smtClean="0">
+                  <a:solidFill>
+                    <a:srgbClr val="C00000"/>
+                  </a:solidFill>
+                  <a:latin typeface="XB Kayhan" panose="02000503080000020003" pitchFamily="2" charset="-78"/>
+                  <a:cs typeface="XB Kayhan" panose="02000503080000020003" pitchFamily="2" charset="-78"/>
+                </a:rPr>
+                <a:t>دانشگاه تحصیلات تکمیلی علوم پایه زنجان</a:t>
+              </a:r>
+              <a:endParaRPr lang="en-US" sz="1100" b="1" dirty="0">
                 <a:solidFill>
                   <a:srgbClr val="C00000"/>
                 </a:solidFill>
                 <a:latin typeface="XB Kayhan" panose="02000503080000020003" pitchFamily="2" charset="-78"/>
                 <a:cs typeface="XB Kayhan" panose="02000503080000020003" pitchFamily="2" charset="-78"/>
-              </a:rPr>
-              <a:t>بیست و ششمین گردهمایی فیزیک ماده چگال</a:t>
-            </a:r>
-          </a:p>
-          <a:p>
-            <a:pPr algn="ctr"/>
-            <a:r>
-              <a:rPr lang="fa-IR" b="1" dirty="0" smtClean="0">
-                <a:solidFill>
-                  <a:srgbClr val="C00000"/>
-                </a:solidFill>
-                <a:latin typeface="XB Kayhan" panose="02000503080000020003" pitchFamily="2" charset="-78"/>
-                <a:cs typeface="XB Kayhan" panose="02000503080000020003" pitchFamily="2" charset="-78"/>
-              </a:rPr>
-              <a:t>دانشگاه تحصیلات تکمیلی علوم پایه زنجان</a:t>
-            </a:r>
-            <a:endParaRPr lang="en-US" b="1" dirty="0">
-              <a:solidFill>
-                <a:srgbClr val="C00000"/>
-              </a:solidFill>
-              <a:latin typeface="XB Kayhan" panose="02000503080000020003" pitchFamily="2" charset="-78"/>
-              <a:cs typeface="XB Kayhan" panose="02000503080000020003" pitchFamily="2" charset="-78"/>
-            </a:endParaRPr>
-          </a:p>
-        </p:txBody>
-      </p:sp>
+              </a:endParaRPr>
+            </a:p>
+          </p:txBody>
+        </p:sp>
+      </p:grpSp>
       <p:pic>
         <p:nvPicPr>
           <p:cNvPr id="6" name="Picture 5"/>
@@ -3140,7 +3219,17 @@
           <p:nvPr/>
         </p:nvPicPr>
         <p:blipFill rotWithShape="1">
-          <a:blip r:embed="rId2">
+          <a:blip r:embed="rId2" cstate="print">
+            <a:clrChange>
+              <a:clrFrom>
+                <a:srgbClr val="FFFFFF"/>
+              </a:clrFrom>
+              <a:clrTo>
+                <a:srgbClr val="FFFFFF">
+                  <a:alpha val="0"/>
+                </a:srgbClr>
+              </a:clrTo>
+            </a:clrChange>
             <a:extLst>
               <a:ext uri="{28A0092B-C50C-407E-A947-70E740481C1C}">
                 <a14:useLocalDpi xmlns:a14="http://schemas.microsoft.com/office/drawing/2010/main" val="0"/>
@@ -3152,8 +3241,8 @@
         </p:blipFill>
         <p:spPr>
           <a:xfrm>
-            <a:off x="232163" y="533400"/>
-            <a:ext cx="1231076" cy="855032"/>
+            <a:off x="898149" y="321994"/>
+            <a:ext cx="682491" cy="474017"/>
           </a:xfrm>
           <a:prstGeom prst="rect">
             <a:avLst/>
@@ -3162,14 +3251,24 @@
       </p:pic>
       <p:pic>
         <p:nvPicPr>
-          <p:cNvPr id="8" name="Picture 7"/>
+          <p:cNvPr id="3" name="Picture 2"/>
           <p:cNvPicPr>
             <a:picLocks noChangeAspect="1"/>
           </p:cNvPicPr>
           <p:nvPr/>
         </p:nvPicPr>
         <p:blipFill>
-          <a:blip r:embed="rId3">
+          <a:blip r:embed="rId3" cstate="print">
+            <a:clrChange>
+              <a:clrFrom>
+                <a:srgbClr val="FFFFFF"/>
+              </a:clrFrom>
+              <a:clrTo>
+                <a:srgbClr val="FFFFFF">
+                  <a:alpha val="0"/>
+                </a:srgbClr>
+              </a:clrTo>
+            </a:clrChange>
             <a:extLst>
               <a:ext uri="{28A0092B-C50C-407E-A947-70E740481C1C}">
                 <a14:useLocalDpi xmlns:a14="http://schemas.microsoft.com/office/drawing/2010/main" val="0"/>
@@ -3182,138 +3281,31 @@
         </p:blipFill>
         <p:spPr>
           <a:xfrm>
-            <a:off x="228600" y="1554480"/>
-            <a:ext cx="6400800" cy="2231137"/>
+            <a:off x="329822" y="231666"/>
+            <a:ext cx="540000" cy="540000"/>
           </a:xfrm>
           <a:prstGeom prst="rect">
             <a:avLst/>
           </a:prstGeom>
         </p:spPr>
       </p:pic>
-      <p:sp>
-        <p:nvSpPr>
-          <p:cNvPr id="10" name="TextBox 9"/>
-          <p:cNvSpPr txBox="1"/>
-          <p:nvPr/>
-        </p:nvSpPr>
-        <p:spPr>
-          <a:xfrm>
-            <a:off x="208337" y="4009157"/>
-            <a:ext cx="6441323" cy="1208023"/>
-          </a:xfrm>
-          <a:prstGeom prst="rect">
-            <a:avLst/>
-          </a:prstGeom>
-          <a:noFill/>
-        </p:spPr>
-        <p:txBody>
-          <a:bodyPr wrap="square" rtlCol="0">
-            <a:spAutoFit/>
-          </a:bodyPr>
-          <a:lstStyle/>
-          <a:p>
-            <a:pPr algn="just" rtl="1"/>
-            <a:r>
-              <a:rPr lang="fa-IR" sz="1450" dirty="0">
-                <a:latin typeface="XB Kayhan" panose="02000503080000020003" pitchFamily="2" charset="-78"/>
-                <a:cs typeface="XB Kayhan" panose="02000503080000020003" pitchFamily="2" charset="-78"/>
-              </a:rPr>
-              <a:t>هدف از اين گردهمايي فراهم آوردن محيطي براي ارایه نتايج پژوهش، گفتگو و تبادل نظر در </a:t>
-            </a:r>
-            <a:r>
-              <a:rPr lang="fa-IR" sz="1450" dirty="0" smtClean="0">
-                <a:latin typeface="XB Kayhan" panose="02000503080000020003" pitchFamily="2" charset="-78"/>
-                <a:cs typeface="XB Kayhan" panose="02000503080000020003" pitchFamily="2" charset="-78"/>
-              </a:rPr>
-              <a:t>زمينه‌های </a:t>
-            </a:r>
-            <a:r>
-              <a:rPr lang="fa-IR" sz="1450" dirty="0">
-                <a:latin typeface="XB Kayhan" panose="02000503080000020003" pitchFamily="2" charset="-78"/>
-                <a:cs typeface="XB Kayhan" panose="02000503080000020003" pitchFamily="2" charset="-78"/>
-              </a:rPr>
-              <a:t>تجربي و نظري </a:t>
-            </a:r>
-            <a:r>
-              <a:rPr lang="fa-IR" sz="1450" dirty="0" smtClean="0">
-                <a:latin typeface="XB Kayhan" panose="02000503080000020003" pitchFamily="2" charset="-78"/>
-                <a:cs typeface="XB Kayhan" panose="02000503080000020003" pitchFamily="2" charset="-78"/>
-              </a:rPr>
-              <a:t>فيزيک </a:t>
-            </a:r>
-            <a:r>
-              <a:rPr lang="fa-IR" sz="1450" dirty="0">
-                <a:latin typeface="XB Kayhan" panose="02000503080000020003" pitchFamily="2" charset="-78"/>
-                <a:cs typeface="XB Kayhan" panose="02000503080000020003" pitchFamily="2" charset="-78"/>
-              </a:rPr>
-              <a:t>ماده چگال است. اين </a:t>
-            </a:r>
-            <a:r>
-              <a:rPr lang="fa-IR" sz="1450" dirty="0" smtClean="0">
-                <a:latin typeface="XB Kayhan" panose="02000503080000020003" pitchFamily="2" charset="-78"/>
-                <a:cs typeface="XB Kayhan" panose="02000503080000020003" pitchFamily="2" charset="-78"/>
-              </a:rPr>
-              <a:t>گردهمايی </a:t>
-            </a:r>
-            <a:r>
-              <a:rPr lang="fa-IR" sz="1450" dirty="0">
-                <a:latin typeface="XB Kayhan" panose="02000503080000020003" pitchFamily="2" charset="-78"/>
-                <a:cs typeface="XB Kayhan" panose="02000503080000020003" pitchFamily="2" charset="-78"/>
-              </a:rPr>
-              <a:t>فرصت مناسبي براي دانش‌پژوهان جوان و دانشجويان است كه با شركت در آن تجربه كسب كنند. امسال این گردهمایی به صورت </a:t>
-            </a:r>
-            <a:r>
-              <a:rPr lang="fa-IR" sz="1450" b="1" dirty="0" smtClean="0">
-                <a:latin typeface="XB Kayhan" panose="02000503080000020003" pitchFamily="2" charset="-78"/>
-                <a:cs typeface="XB Kayhan" panose="02000503080000020003" pitchFamily="2" charset="-78"/>
-              </a:rPr>
-              <a:t>مجازی و آنلاین </a:t>
-            </a:r>
-            <a:r>
-              <a:rPr lang="fa-IR" sz="1450" dirty="0">
-                <a:latin typeface="XB Kayhan" panose="02000503080000020003" pitchFamily="2" charset="-78"/>
-                <a:cs typeface="XB Kayhan" panose="02000503080000020003" pitchFamily="2" charset="-78"/>
-              </a:rPr>
-              <a:t>برگزار خواهد شد. پژوهشگران </a:t>
-            </a:r>
-            <a:r>
-              <a:rPr lang="fa-IR" sz="1450" dirty="0" smtClean="0">
-                <a:latin typeface="XB Kayhan" panose="02000503080000020003" pitchFamily="2" charset="-78"/>
-                <a:cs typeface="XB Kayhan" panose="02000503080000020003" pitchFamily="2" charset="-78"/>
-              </a:rPr>
-              <a:t>می‌توانند </a:t>
-            </a:r>
-            <a:r>
-              <a:rPr lang="fa-IR" sz="1450" dirty="0">
-                <a:latin typeface="XB Kayhan" panose="02000503080000020003" pitchFamily="2" charset="-78"/>
-                <a:cs typeface="XB Kayhan" panose="02000503080000020003" pitchFamily="2" charset="-78"/>
-              </a:rPr>
-              <a:t>جهت ارایه نتایج تحقیق خود به صورت پوستر، چکیده تحقیق خود را مطابق الگوی موجود در سایت گردهمایی ارسال کنند.</a:t>
-            </a:r>
-            <a:endParaRPr lang="fa-IR" sz="1450" dirty="0" smtClean="0">
-              <a:latin typeface="XB Kayhan" panose="02000503080000020003" pitchFamily="2" charset="-78"/>
-              <a:cs typeface="XB Kayhan" panose="02000503080000020003" pitchFamily="2" charset="-78"/>
-            </a:endParaRPr>
-          </a:p>
-        </p:txBody>
-      </p:sp>
       <p:grpSp>
         <p:nvGrpSpPr>
-          <p:cNvPr id="18" name="Group 17"/>
+          <p:cNvPr id="32" name="Group 31"/>
           <p:cNvGrpSpPr/>
           <p:nvPr/>
         </p:nvGrpSpPr>
         <p:grpSpPr>
           <a:xfrm>
-            <a:off x="3390899" y="5527509"/>
-            <a:ext cx="3223744" cy="1650310"/>
-            <a:chOff x="151916" y="5845235"/>
-            <a:chExt cx="3223744" cy="1824045"/>
+            <a:off x="3485663" y="3164600"/>
+            <a:ext cx="3147060" cy="1571423"/>
+            <a:chOff x="228600" y="5845235"/>
+            <a:chExt cx="3147060" cy="1736853"/>
           </a:xfrm>
         </p:grpSpPr>
         <p:sp>
           <p:nvSpPr>
-            <p:cNvPr id="17" name="Rounded Rectangle 16"/>
+            <p:cNvPr id="33" name="Rounded Rectangle 32"/>
             <p:cNvSpPr/>
             <p:nvPr/>
           </p:nvSpPr>
@@ -3366,14 +3358,14 @@
         </p:sp>
         <p:sp>
           <p:nvSpPr>
-            <p:cNvPr id="11" name="TextBox 10"/>
+            <p:cNvPr id="34" name="TextBox 33"/>
             <p:cNvSpPr txBox="1"/>
             <p:nvPr/>
           </p:nvSpPr>
           <p:spPr>
             <a:xfrm>
-              <a:off x="151916" y="5917366"/>
-              <a:ext cx="3223743" cy="1751914"/>
+              <a:off x="334325" y="5917366"/>
+              <a:ext cx="2955925" cy="1564816"/>
             </a:xfrm>
             <a:prstGeom prst="rect">
               <a:avLst/>
@@ -3426,15 +3418,61 @@
             <a:p>
               <a:pPr algn="r" rtl="1"/>
               <a:r>
+                <a:rPr lang="ar-SA" sz="1400" b="1" dirty="0" smtClean="0">
+                  <a:cs typeface="B Lotus" panose="00000400000000000000" pitchFamily="2" charset="-78"/>
+                </a:rPr>
+                <a:t>عنوان </a:t>
+              </a:r>
+              <a:r>
                 <a:rPr lang="fa-IR" sz="1400" b="1" dirty="0" smtClean="0">
-                  <a:latin typeface="XB Kayhan" panose="02000503080000020003" pitchFamily="2" charset="-78"/>
-                  <a:cs typeface="XB Kayhan" panose="02000503080000020003" pitchFamily="2" charset="-78"/>
-                </a:rPr>
-                <a:t>کمیته علمی:</a:t>
-              </a:r>
-              <a:endParaRPr lang="en-US" sz="1400" b="1" dirty="0" smtClean="0">
-                <a:latin typeface="XB Kayhan" panose="02000503080000020003" pitchFamily="2" charset="-78"/>
-                <a:cs typeface="XB Kayhan" panose="02000503080000020003" pitchFamily="2" charset="-78"/>
+                  <a:cs typeface="B Lotus" panose="00000400000000000000" pitchFamily="2" charset="-78"/>
+                </a:rPr>
+                <a:t>بخش</a:t>
+              </a:r>
+              <a:r>
+                <a:rPr lang="ar-SA" sz="1400" b="1" dirty="0" smtClean="0">
+                  <a:cs typeface="B Lotus" panose="00000400000000000000" pitchFamily="2" charset="-78"/>
+                </a:rPr>
+                <a:t> </a:t>
+              </a:r>
+              <a:r>
+                <a:rPr lang="ar-SA" sz="1400" b="1" dirty="0">
+                  <a:cs typeface="B Lotus" panose="00000400000000000000" pitchFamily="2" charset="-78"/>
+                </a:rPr>
+                <a:t>عنوان مقاله (</a:t>
+              </a:r>
+              <a:r>
+                <a:rPr lang="en-US" sz="1400" b="1" dirty="0">
+                  <a:cs typeface="B Lotus" panose="00000400000000000000" pitchFamily="2" charset="-78"/>
+                </a:rPr>
+                <a:t>B Lotus </a:t>
+              </a:r>
+              <a:r>
+                <a:rPr lang="en-US" sz="1400" b="1" dirty="0" smtClean="0">
+                  <a:cs typeface="B Lotus" panose="00000400000000000000" pitchFamily="2" charset="-78"/>
+                </a:rPr>
+                <a:t>1</a:t>
+              </a:r>
+              <a:r>
+                <a:rPr lang="en-US" sz="1400" b="1" dirty="0">
+                  <a:cs typeface="B Lotus" panose="00000400000000000000" pitchFamily="2" charset="-78"/>
+                </a:rPr>
+                <a:t>4</a:t>
+              </a:r>
+              <a:r>
+                <a:rPr lang="ar-SA" sz="1400" b="1" dirty="0" smtClean="0">
+                  <a:cs typeface="B Lotus" panose="00000400000000000000" pitchFamily="2" charset="-78"/>
+                </a:rPr>
+                <a:t>پررنگ</a:t>
+              </a:r>
+              <a:r>
+                <a:rPr lang="ar-SA" sz="1400" b="1" dirty="0">
+                  <a:cs typeface="B Lotus" panose="00000400000000000000" pitchFamily="2" charset="-78"/>
+                </a:rPr>
+                <a:t>)</a:t>
+              </a:r>
+              <a:endParaRPr lang="en-US" sz="1400" b="1" dirty="0">
+                <a:cs typeface="B Lotus" panose="00000400000000000000" pitchFamily="2" charset="-78"/>
               </a:endParaRPr>
             </a:p>
             <a:p>
@@ -3445,219 +3483,278 @@
               </a:endParaRPr>
             </a:p>
             <a:p>
-              <a:pPr algn="r" rtl="1"/>
+              <a:pPr algn="just" rtl="1"/>
               <a:r>
                 <a:rPr lang="fa-IR" sz="1100" dirty="0">
                   <a:latin typeface="XB Kayhan" panose="02000503080000020003" pitchFamily="2" charset="-78"/>
                   <a:cs typeface="XB Kayhan" panose="02000503080000020003" pitchFamily="2" charset="-78"/>
                 </a:rPr>
-                <a:t>مینا </a:t>
+                <a:t>متن </a:t>
               </a:r>
               <a:r>
                 <a:rPr lang="fa-IR" sz="1100" dirty="0" smtClean="0">
                   <a:latin typeface="XB Kayhan" panose="02000503080000020003" pitchFamily="2" charset="-78"/>
                   <a:cs typeface="XB Kayhan" panose="02000503080000020003" pitchFamily="2" charset="-78"/>
                 </a:rPr>
-                <a:t>زارعی </a:t>
-              </a:r>
-              <a:r>
-                <a:rPr lang="fa-IR" sz="1000" dirty="0" smtClean="0">
-                  <a:latin typeface="XB Kayhan" panose="02000503080000020003" pitchFamily="2" charset="-78"/>
-                  <a:cs typeface="XB Kayhan" panose="02000503080000020003" pitchFamily="2" charset="-78"/>
-                </a:rPr>
-                <a:t>(دانشگاه </a:t>
-              </a:r>
-              <a:r>
-                <a:rPr lang="fa-IR" sz="1000" dirty="0">
-                  <a:latin typeface="XB Kayhan" panose="02000503080000020003" pitchFamily="2" charset="-78"/>
-                  <a:cs typeface="XB Kayhan" panose="02000503080000020003" pitchFamily="2" charset="-78"/>
-                </a:rPr>
-                <a:t>تحصیلات تکمیلی علوم پایه زنجان) </a:t>
-              </a:r>
-            </a:p>
-            <a:p>
-              <a:pPr algn="r" rtl="1"/>
+                <a:t>آزمایشی</a:t>
+              </a:r>
+              <a:r>
+                <a:rPr lang="en-US" sz="1100" dirty="0" smtClean="0">
+                  <a:latin typeface="XB Kayhan" panose="02000503080000020003" pitchFamily="2" charset="-78"/>
+                  <a:cs typeface="XB Kayhan" panose="02000503080000020003" pitchFamily="2" charset="-78"/>
+                </a:rPr>
+                <a:t> </a:t>
+              </a:r>
+              <a:r>
+                <a:rPr lang="ar-SA" sz="1100" dirty="0"/>
+                <a:t>(</a:t>
+              </a:r>
+              <a:r>
+                <a:rPr lang="en-US" sz="1100" dirty="0"/>
+                <a:t>B Lotus </a:t>
+              </a:r>
+              <a:r>
+                <a:rPr lang="en-US" sz="1100" dirty="0" smtClean="0"/>
+                <a:t>11</a:t>
+              </a:r>
+              <a:r>
+                <a:rPr lang="fa-IR" sz="1100" dirty="0" smtClean="0"/>
+                <a:t>)</a:t>
+              </a:r>
               <a:r>
                 <a:rPr lang="fa-IR" sz="1100" dirty="0" smtClean="0">
                   <a:latin typeface="XB Kayhan" panose="02000503080000020003" pitchFamily="2" charset="-78"/>
                   <a:cs typeface="XB Kayhan" panose="02000503080000020003" pitchFamily="2" charset="-78"/>
                 </a:rPr>
-                <a:t>سعید عابدین‌پور </a:t>
-              </a:r>
-              <a:r>
-                <a:rPr lang="fa-IR" sz="1000" dirty="0" smtClean="0">
-                  <a:latin typeface="XB Kayhan" panose="02000503080000020003" pitchFamily="2" charset="-78"/>
-                  <a:cs typeface="XB Kayhan" panose="02000503080000020003" pitchFamily="2" charset="-78"/>
-                </a:rPr>
-                <a:t>(دانشگاه </a:t>
-              </a:r>
-              <a:r>
-                <a:rPr lang="fa-IR" sz="1000" dirty="0">
-                  <a:latin typeface="XB Kayhan" panose="02000503080000020003" pitchFamily="2" charset="-78"/>
-                  <a:cs typeface="XB Kayhan" panose="02000503080000020003" pitchFamily="2" charset="-78"/>
-                </a:rPr>
-                <a:t>تحصیلات تکمیلی علوم پایه زنجان) </a:t>
-              </a:r>
-              <a:endParaRPr lang="fa-IR" sz="1000" dirty="0" smtClean="0">
-                <a:latin typeface="XB Kayhan" panose="02000503080000020003" pitchFamily="2" charset="-78"/>
-                <a:cs typeface="XB Kayhan" panose="02000503080000020003" pitchFamily="2" charset="-78"/>
-              </a:endParaRPr>
-            </a:p>
-            <a:p>
-              <a:pPr algn="r" rtl="1"/>
+                <a:t> </a:t>
+              </a:r>
+              <a:r>
+                <a:rPr lang="fa-IR" sz="1100" dirty="0">
+                  <a:latin typeface="XB Kayhan" panose="02000503080000020003" pitchFamily="2" charset="-78"/>
+                  <a:cs typeface="XB Kayhan" panose="02000503080000020003" pitchFamily="2" charset="-78"/>
+                </a:rPr>
+                <a:t>متن </a:t>
+              </a:r>
               <a:r>
                 <a:rPr lang="fa-IR" sz="1100" dirty="0" smtClean="0">
                   <a:latin typeface="XB Kayhan" panose="02000503080000020003" pitchFamily="2" charset="-78"/>
                   <a:cs typeface="XB Kayhan" panose="02000503080000020003" pitchFamily="2" charset="-78"/>
                 </a:rPr>
-                <a:t>داود عباس‌زاده </a:t>
-              </a:r>
-              <a:r>
-                <a:rPr lang="fa-IR" sz="1000" dirty="0" smtClean="0">
-                  <a:latin typeface="XB Kayhan" panose="02000503080000020003" pitchFamily="2" charset="-78"/>
-                  <a:cs typeface="XB Kayhan" panose="02000503080000020003" pitchFamily="2" charset="-78"/>
-                </a:rPr>
-                <a:t>(دانشگاه تحصیلات تکمیلی علوم پایه زنجان)</a:t>
-              </a:r>
-              <a:endParaRPr lang="en-US" sz="1100" dirty="0" smtClean="0">
-                <a:latin typeface="XB Kayhan" panose="02000503080000020003" pitchFamily="2" charset="-78"/>
-                <a:cs typeface="XB Kayhan" panose="02000503080000020003" pitchFamily="2" charset="-78"/>
-              </a:endParaRPr>
-            </a:p>
-            <a:p>
-              <a:pPr algn="r" rtl="1"/>
+                <a:t>آزمایشی</a:t>
+              </a:r>
+              <a:r>
+                <a:rPr lang="fa-IR" sz="1100" dirty="0">
+                  <a:latin typeface="XB Kayhan" panose="02000503080000020003" pitchFamily="2" charset="-78"/>
+                  <a:cs typeface="XB Kayhan" panose="02000503080000020003" pitchFamily="2" charset="-78"/>
+                </a:rPr>
+                <a:t> متن آزمایشی متن </a:t>
+              </a:r>
               <a:r>
                 <a:rPr lang="fa-IR" sz="1100" dirty="0" smtClean="0">
                   <a:latin typeface="XB Kayhan" panose="02000503080000020003" pitchFamily="2" charset="-78"/>
                   <a:cs typeface="XB Kayhan" panose="02000503080000020003" pitchFamily="2" charset="-78"/>
                 </a:rPr>
-                <a:t>زهرا فرائی </a:t>
-              </a:r>
-              <a:r>
-                <a:rPr lang="fa-IR" sz="1000" dirty="0" smtClean="0">
-                  <a:latin typeface="XB Kayhan" panose="02000503080000020003" pitchFamily="2" charset="-78"/>
-                  <a:cs typeface="XB Kayhan" panose="02000503080000020003" pitchFamily="2" charset="-78"/>
-                </a:rPr>
-                <a:t>(دانشگاه </a:t>
-              </a:r>
-              <a:r>
-                <a:rPr lang="fa-IR" sz="1000" dirty="0">
-                  <a:latin typeface="XB Kayhan" panose="02000503080000020003" pitchFamily="2" charset="-78"/>
-                  <a:cs typeface="XB Kayhan" panose="02000503080000020003" pitchFamily="2" charset="-78"/>
-                </a:rPr>
-                <a:t>تحصیلات تکمیلی علوم پایه زنجان)</a:t>
-              </a:r>
-              <a:endParaRPr lang="fa-IR" sz="1000" dirty="0" smtClean="0">
-                <a:latin typeface="XB Kayhan" panose="02000503080000020003" pitchFamily="2" charset="-78"/>
-                <a:cs typeface="XB Kayhan" panose="02000503080000020003" pitchFamily="2" charset="-78"/>
-              </a:endParaRPr>
-            </a:p>
-            <a:p>
-              <a:pPr algn="r" rtl="1"/>
+                <a:t>آزمایشی</a:t>
+              </a:r>
               <a:r>
                 <a:rPr lang="fa-IR" sz="1100" dirty="0">
                   <a:latin typeface="XB Kayhan" panose="02000503080000020003" pitchFamily="2" charset="-78"/>
                   <a:cs typeface="XB Kayhan" panose="02000503080000020003" pitchFamily="2" charset="-78"/>
                 </a:rPr>
-                <a:t>فرشید </a:t>
+                <a:t> متن آزمایشی متن </a:t>
               </a:r>
               <a:r>
                 <a:rPr lang="fa-IR" sz="1100" dirty="0" smtClean="0">
                   <a:latin typeface="XB Kayhan" panose="02000503080000020003" pitchFamily="2" charset="-78"/>
                   <a:cs typeface="XB Kayhan" panose="02000503080000020003" pitchFamily="2" charset="-78"/>
                 </a:rPr>
-                <a:t>محمدرفیعی </a:t>
-              </a:r>
-              <a:r>
-                <a:rPr lang="fa-IR" sz="1000" dirty="0" smtClean="0">
-                  <a:latin typeface="XB Kayhan" panose="02000503080000020003" pitchFamily="2" charset="-78"/>
-                  <a:cs typeface="XB Kayhan" panose="02000503080000020003" pitchFamily="2" charset="-78"/>
-                </a:rPr>
-                <a:t>(دانشگاه </a:t>
-              </a:r>
-              <a:r>
-                <a:rPr lang="fa-IR" sz="1000" dirty="0">
-                  <a:latin typeface="XB Kayhan" panose="02000503080000020003" pitchFamily="2" charset="-78"/>
-                  <a:cs typeface="XB Kayhan" panose="02000503080000020003" pitchFamily="2" charset="-78"/>
-                </a:rPr>
-                <a:t>تحصیلات تکمیلی علوم پایه زنجان)</a:t>
-              </a:r>
-            </a:p>
-            <a:p>
-              <a:pPr algn="r" rtl="1"/>
+                <a:t>آزمایشی</a:t>
+              </a:r>
+              <a:r>
+                <a:rPr lang="fa-IR" sz="1100" dirty="0">
+                  <a:latin typeface="XB Kayhan" panose="02000503080000020003" pitchFamily="2" charset="-78"/>
+                  <a:cs typeface="XB Kayhan" panose="02000503080000020003" pitchFamily="2" charset="-78"/>
+                </a:rPr>
+                <a:t> متن آزمایشی متن </a:t>
+              </a:r>
               <a:r>
                 <a:rPr lang="fa-IR" sz="1100" dirty="0" smtClean="0">
                   <a:latin typeface="XB Kayhan" panose="02000503080000020003" pitchFamily="2" charset="-78"/>
                   <a:cs typeface="XB Kayhan" panose="02000503080000020003" pitchFamily="2" charset="-78"/>
                 </a:rPr>
-                <a:t>علیرضا ولی‌زاده (</a:t>
-              </a:r>
-              <a:r>
-                <a:rPr lang="fa-IR" sz="1100" b="1" dirty="0" smtClean="0">
-                  <a:latin typeface="XB Kayhan" panose="02000503080000020003" pitchFamily="2" charset="-78"/>
-                  <a:cs typeface="XB Kayhan" panose="02000503080000020003" pitchFamily="2" charset="-78"/>
-                </a:rPr>
-                <a:t>دبیر</a:t>
+                <a:t>آزمایشی</a:t>
+              </a:r>
+              <a:r>
+                <a:rPr lang="fa-IR" sz="1100" dirty="0">
+                  <a:latin typeface="XB Kayhan" panose="02000503080000020003" pitchFamily="2" charset="-78"/>
+                  <a:cs typeface="XB Kayhan" panose="02000503080000020003" pitchFamily="2" charset="-78"/>
+                </a:rPr>
+                <a:t> متن آزمایشی متن </a:t>
               </a:r>
               <a:r>
                 <a:rPr lang="fa-IR" sz="1100" dirty="0" smtClean="0">
                   <a:latin typeface="XB Kayhan" panose="02000503080000020003" pitchFamily="2" charset="-78"/>
                   <a:cs typeface="XB Kayhan" panose="02000503080000020003" pitchFamily="2" charset="-78"/>
                 </a:rPr>
-                <a:t>)</a:t>
-              </a:r>
-              <a:r>
-                <a:rPr lang="fa-IR" sz="1000" dirty="0" smtClean="0">
-                  <a:latin typeface="XB Kayhan" panose="02000503080000020003" pitchFamily="2" charset="-78"/>
-                  <a:cs typeface="XB Kayhan" panose="02000503080000020003" pitchFamily="2" charset="-78"/>
-                </a:rPr>
-                <a:t>(</a:t>
-              </a:r>
-              <a:r>
-                <a:rPr lang="fa-IR" sz="1000" dirty="0">
-                  <a:latin typeface="XB Kayhan" panose="02000503080000020003" pitchFamily="2" charset="-78"/>
-                  <a:cs typeface="XB Kayhan" panose="02000503080000020003" pitchFamily="2" charset="-78"/>
-                </a:rPr>
-                <a:t>دانشگاه تحصیلات تکمیلی علوم پایه زنجان)</a:t>
-              </a:r>
-            </a:p>
-            <a:p>
-              <a:pPr algn="r" rtl="1"/>
-              <a:endParaRPr lang="en-US" sz="1100" dirty="0" smtClean="0">
-                <a:latin typeface="XB Kayhan" panose="02000503080000020003" pitchFamily="2" charset="-78"/>
-                <a:cs typeface="XB Kayhan" panose="02000503080000020003" pitchFamily="2" charset="-78"/>
-              </a:endParaRPr>
+                <a:t>آزمایشی</a:t>
+              </a:r>
+              <a:r>
+                <a:rPr lang="fa-IR" sz="1100" dirty="0">
+                  <a:latin typeface="XB Kayhan" panose="02000503080000020003" pitchFamily="2" charset="-78"/>
+                  <a:cs typeface="XB Kayhan" panose="02000503080000020003" pitchFamily="2" charset="-78"/>
+                </a:rPr>
+                <a:t> </a:t>
+              </a:r>
+              <a:r>
+                <a:rPr lang="fa-IR" sz="1100" dirty="0" smtClean="0">
+                  <a:latin typeface="XB Kayhan" panose="02000503080000020003" pitchFamily="2" charset="-78"/>
+                  <a:cs typeface="XB Kayhan" panose="02000503080000020003" pitchFamily="2" charset="-78"/>
+                </a:rPr>
+                <a:t>متن</a:t>
+              </a:r>
+              <a:r>
+                <a:rPr lang="en-US" sz="1100" dirty="0"/>
+                <a:t> </a:t>
+              </a:r>
+              <a:r>
+                <a:rPr lang="fa-IR" sz="1100" dirty="0"/>
+                <a:t>متن </a:t>
+              </a:r>
+              <a:r>
+                <a:rPr lang="fa-IR" sz="1100" dirty="0" smtClean="0"/>
+                <a:t>متن متن </a:t>
+              </a:r>
+              <a:r>
+                <a:rPr lang="fa-IR" sz="1100" dirty="0" smtClean="0">
+                  <a:latin typeface="XB Kayhan" panose="02000503080000020003" pitchFamily="2" charset="-78"/>
+                  <a:cs typeface="XB Kayhan" panose="02000503080000020003" pitchFamily="2" charset="-78"/>
+                </a:rPr>
+                <a:t>آزمایشی </a:t>
+              </a:r>
+              <a:r>
+                <a:rPr lang="fa-IR" sz="1100" dirty="0">
+                  <a:latin typeface="XB Kayhan" panose="02000503080000020003" pitchFamily="2" charset="-78"/>
+                  <a:cs typeface="XB Kayhan" panose="02000503080000020003" pitchFamily="2" charset="-78"/>
+                </a:rPr>
+                <a:t>متن </a:t>
+              </a:r>
+              <a:r>
+                <a:rPr lang="fa-IR" sz="1100" dirty="0" smtClean="0">
+                  <a:latin typeface="XB Kayhan" panose="02000503080000020003" pitchFamily="2" charset="-78"/>
+                  <a:cs typeface="XB Kayhan" panose="02000503080000020003" pitchFamily="2" charset="-78"/>
+                </a:rPr>
+                <a:t>آزمایشی</a:t>
+              </a:r>
+              <a:r>
+                <a:rPr lang="fa-IR" sz="1100" dirty="0">
+                  <a:latin typeface="XB Kayhan" panose="02000503080000020003" pitchFamily="2" charset="-78"/>
+                  <a:cs typeface="XB Kayhan" panose="02000503080000020003" pitchFamily="2" charset="-78"/>
+                </a:rPr>
+                <a:t> متن آزمایشی متن </a:t>
+              </a:r>
+              <a:r>
+                <a:rPr lang="fa-IR" sz="1100" dirty="0" smtClean="0">
+                  <a:latin typeface="XB Kayhan" panose="02000503080000020003" pitchFamily="2" charset="-78"/>
+                  <a:cs typeface="XB Kayhan" panose="02000503080000020003" pitchFamily="2" charset="-78"/>
+                </a:rPr>
+                <a:t>آزمایشی</a:t>
+              </a:r>
+              <a:r>
+                <a:rPr lang="fa-IR" sz="1100" dirty="0">
+                  <a:latin typeface="XB Kayhan" panose="02000503080000020003" pitchFamily="2" charset="-78"/>
+                  <a:cs typeface="XB Kayhan" panose="02000503080000020003" pitchFamily="2" charset="-78"/>
+                </a:rPr>
+                <a:t> متن آزمایشی متن </a:t>
+              </a:r>
+              <a:r>
+                <a:rPr lang="fa-IR" sz="1100" dirty="0" smtClean="0">
+                  <a:latin typeface="XB Kayhan" panose="02000503080000020003" pitchFamily="2" charset="-78"/>
+                  <a:cs typeface="XB Kayhan" panose="02000503080000020003" pitchFamily="2" charset="-78"/>
+                </a:rPr>
+                <a:t>آزمایشی</a:t>
+              </a:r>
+              <a:r>
+                <a:rPr lang="fa-IR" sz="1100" dirty="0">
+                  <a:latin typeface="XB Kayhan" panose="02000503080000020003" pitchFamily="2" charset="-78"/>
+                  <a:cs typeface="XB Kayhan" panose="02000503080000020003" pitchFamily="2" charset="-78"/>
+                </a:rPr>
+                <a:t> متن آزمایشی متن </a:t>
+              </a:r>
+              <a:r>
+                <a:rPr lang="fa-IR" sz="1100" dirty="0" smtClean="0">
+                  <a:latin typeface="XB Kayhan" panose="02000503080000020003" pitchFamily="2" charset="-78"/>
+                  <a:cs typeface="XB Kayhan" panose="02000503080000020003" pitchFamily="2" charset="-78"/>
+                </a:rPr>
+                <a:t>آزمایشی</a:t>
+              </a:r>
+              <a:r>
+                <a:rPr lang="fa-IR" sz="1100" dirty="0">
+                  <a:latin typeface="XB Kayhan" panose="02000503080000020003" pitchFamily="2" charset="-78"/>
+                  <a:cs typeface="XB Kayhan" panose="02000503080000020003" pitchFamily="2" charset="-78"/>
+                </a:rPr>
+                <a:t> متن آزمایشی متن </a:t>
+              </a:r>
+              <a:r>
+                <a:rPr lang="fa-IR" sz="1100" dirty="0" smtClean="0">
+                  <a:latin typeface="XB Kayhan" panose="02000503080000020003" pitchFamily="2" charset="-78"/>
+                  <a:cs typeface="XB Kayhan" panose="02000503080000020003" pitchFamily="2" charset="-78"/>
+                </a:rPr>
+                <a:t>آزمایشی</a:t>
+              </a:r>
+              <a:r>
+                <a:rPr lang="fa-IR" sz="1100" dirty="0">
+                  <a:latin typeface="XB Kayhan" panose="02000503080000020003" pitchFamily="2" charset="-78"/>
+                  <a:cs typeface="XB Kayhan" panose="02000503080000020003" pitchFamily="2" charset="-78"/>
+                </a:rPr>
+                <a:t> متن آزمایشی متن </a:t>
+              </a:r>
+              <a:r>
+                <a:rPr lang="fa-IR" sz="1100" dirty="0" smtClean="0">
+                  <a:latin typeface="XB Kayhan" panose="02000503080000020003" pitchFamily="2" charset="-78"/>
+                  <a:cs typeface="XB Kayhan" panose="02000503080000020003" pitchFamily="2" charset="-78"/>
+                </a:rPr>
+                <a:t>آزمایشی</a:t>
+              </a:r>
+              <a:r>
+                <a:rPr lang="fa-IR" sz="1100" dirty="0">
+                  <a:latin typeface="XB Kayhan" panose="02000503080000020003" pitchFamily="2" charset="-78"/>
+                  <a:cs typeface="XB Kayhan" panose="02000503080000020003" pitchFamily="2" charset="-78"/>
+                </a:rPr>
+                <a:t> متن </a:t>
+              </a:r>
             </a:p>
           </p:txBody>
         </p:sp>
       </p:grpSp>
       <p:grpSp>
         <p:nvGrpSpPr>
-          <p:cNvPr id="9" name="Group 8"/>
+          <p:cNvPr id="35" name="Group 34"/>
           <p:cNvGrpSpPr/>
           <p:nvPr/>
         </p:nvGrpSpPr>
         <p:grpSpPr>
           <a:xfrm>
-            <a:off x="210684" y="5530676"/>
-            <a:ext cx="3162301" cy="602790"/>
-            <a:chOff x="235977" y="5519408"/>
-            <a:chExt cx="3162301" cy="602790"/>
+            <a:off x="228766" y="3164599"/>
+            <a:ext cx="3147060" cy="1571424"/>
+            <a:chOff x="228600" y="5845235"/>
+            <a:chExt cx="3147060" cy="1736853"/>
           </a:xfrm>
         </p:grpSpPr>
         <p:sp>
           <p:nvSpPr>
-            <p:cNvPr id="15" name="Rounded Rectangle 14"/>
+            <p:cNvPr id="36" name="Rounded Rectangle 35"/>
             <p:cNvSpPr/>
             <p:nvPr/>
           </p:nvSpPr>
           <p:spPr>
             <a:xfrm>
-              <a:off x="235977" y="5519408"/>
-              <a:ext cx="3162301" cy="602790"/>
+              <a:off x="228600" y="5845235"/>
+              <a:ext cx="3147060" cy="1736853"/>
             </a:xfrm>
             <a:prstGeom prst="roundRect">
-              <a:avLst/>
+              <a:avLst>
+                <a:gd name="adj" fmla="val 6909"/>
+              </a:avLst>
             </a:prstGeom>
             <a:solidFill>
               <a:schemeClr val="accent3">
@@ -3698,19 +3795,22 @@
         </p:sp>
         <p:sp>
           <p:nvSpPr>
-            <p:cNvPr id="12" name="TextBox 11"/>
+            <p:cNvPr id="37" name="TextBox 36"/>
             <p:cNvSpPr txBox="1"/>
             <p:nvPr/>
           </p:nvSpPr>
           <p:spPr>
             <a:xfrm>
-              <a:off x="247649" y="5589971"/>
-              <a:ext cx="3146486" cy="461665"/>
+              <a:off x="315211" y="5917365"/>
+              <a:ext cx="2954399" cy="1564815"/>
             </a:xfrm>
             <a:prstGeom prst="rect">
               <a:avLst/>
             </a:prstGeom>
             <a:noFill/>
+            <a:ln>
+              <a:noFill/>
+            </a:ln>
           </p:spPr>
           <p:txBody>
             <a:bodyPr wrap="square" rtlCol="0">
@@ -3718,44 +3818,145 @@
             </a:bodyPr>
             <a:lstStyle/>
             <a:p>
-              <a:pPr algn="ctr"/>
-              <a:r>
-                <a:rPr lang="fa-IR" sz="1150" b="1" dirty="0">
-                  <a:solidFill>
-                    <a:srgbClr val="A00000"/>
-                  </a:solidFill>
-                  <a:latin typeface="XB Kayhan" panose="02000503080000020003" pitchFamily="2" charset="-78"/>
-                  <a:cs typeface="XB Kayhan" panose="02000503080000020003" pitchFamily="2" charset="-78"/>
-                </a:rPr>
-                <a:t>آخرين مهلت درخواست شركت و ارسال </a:t>
-              </a:r>
-              <a:r>
-                <a:rPr lang="fa-IR" sz="1150" b="1" dirty="0" smtClean="0">
-                  <a:solidFill>
-                    <a:srgbClr val="A00000"/>
-                  </a:solidFill>
-                  <a:latin typeface="XB Kayhan" panose="02000503080000020003" pitchFamily="2" charset="-78"/>
-                  <a:cs typeface="XB Kayhan" panose="02000503080000020003" pitchFamily="2" charset="-78"/>
-                </a:rPr>
-                <a:t>چکیده مقاله</a:t>
-              </a:r>
-              <a:br>
-                <a:rPr lang="fa-IR" sz="1150" b="1" dirty="0" smtClean="0">
-                  <a:solidFill>
-                    <a:srgbClr val="A00000"/>
-                  </a:solidFill>
-                  <a:latin typeface="XB Kayhan" panose="02000503080000020003" pitchFamily="2" charset="-78"/>
-                  <a:cs typeface="XB Kayhan" panose="02000503080000020003" pitchFamily="2" charset="-78"/>
-                </a:rPr>
-              </a:br>
-              <a:r>
-                <a:rPr lang="fa-IR" sz="1200" b="1" dirty="0" smtClean="0">
-                  <a:latin typeface="XB Kayhan" panose="02000503080000020003" pitchFamily="2" charset="-78"/>
-                  <a:cs typeface="XB Kayhan" panose="02000503080000020003" pitchFamily="2" charset="-78"/>
-                </a:rPr>
-                <a:t>31 اردیبهشت 1400</a:t>
-              </a:r>
-              <a:endParaRPr lang="en-US" sz="1200" b="1" dirty="0">
+              <a:pPr algn="r" rtl="1"/>
+              <a:endParaRPr lang="en-US" sz="100" b="1" dirty="0" smtClean="0">
+                <a:latin typeface="XB Kayhan" panose="02000503080000020003" pitchFamily="2" charset="-78"/>
+                <a:cs typeface="XB Kayhan" panose="02000503080000020003" pitchFamily="2" charset="-78"/>
+              </a:endParaRPr>
+            </a:p>
+            <a:p>
+              <a:pPr algn="r" rtl="1"/>
+              <a:endParaRPr lang="en-US" sz="100" b="1" dirty="0" smtClean="0">
+                <a:latin typeface="XB Kayhan" panose="02000503080000020003" pitchFamily="2" charset="-78"/>
+                <a:cs typeface="XB Kayhan" panose="02000503080000020003" pitchFamily="2" charset="-78"/>
+              </a:endParaRPr>
+            </a:p>
+            <a:p>
+              <a:pPr algn="r" rtl="1"/>
+              <a:endParaRPr lang="en-US" sz="100" b="1" dirty="0" smtClean="0">
+                <a:latin typeface="XB Kayhan" panose="02000503080000020003" pitchFamily="2" charset="-78"/>
+                <a:cs typeface="XB Kayhan" panose="02000503080000020003" pitchFamily="2" charset="-78"/>
+              </a:endParaRPr>
+            </a:p>
+            <a:p>
+              <a:pPr algn="r" rtl="1"/>
+              <a:endParaRPr lang="en-US" sz="100" b="1" dirty="0" smtClean="0">
+                <a:latin typeface="XB Kayhan" panose="02000503080000020003" pitchFamily="2" charset="-78"/>
+                <a:cs typeface="XB Kayhan" panose="02000503080000020003" pitchFamily="2" charset="-78"/>
+              </a:endParaRPr>
+            </a:p>
+            <a:p>
+              <a:pPr algn="r" rtl="1"/>
+              <a:endParaRPr lang="en-US" sz="100" b="1" dirty="0" smtClean="0">
+                <a:latin typeface="XB Kayhan" panose="02000503080000020003" pitchFamily="2" charset="-78"/>
+                <a:cs typeface="XB Kayhan" panose="02000503080000020003" pitchFamily="2" charset="-78"/>
+              </a:endParaRPr>
+            </a:p>
+            <a:p>
+              <a:pPr algn="r" rtl="1"/>
+              <a:r>
+                <a:rPr lang="ar-SA" sz="1400" b="1" dirty="0" smtClean="0">
+                  <a:cs typeface="B Lotus" panose="00000400000000000000" pitchFamily="2" charset="-78"/>
+                </a:rPr>
+                <a:t>عنوان </a:t>
+              </a:r>
+              <a:r>
+                <a:rPr lang="fa-IR" sz="1400" b="1" dirty="0" smtClean="0">
+                  <a:cs typeface="B Lotus" panose="00000400000000000000" pitchFamily="2" charset="-78"/>
+                </a:rPr>
+                <a:t>بخش</a:t>
+              </a:r>
+              <a:r>
+                <a:rPr lang="ar-SA" sz="1400" b="1" dirty="0" smtClean="0">
+                  <a:cs typeface="B Lotus" panose="00000400000000000000" pitchFamily="2" charset="-78"/>
+                </a:rPr>
+                <a:t> عنوان مقاله (</a:t>
+              </a:r>
+              <a:r>
+                <a:rPr lang="en-US" sz="1400" b="1" dirty="0" smtClean="0">
+                  <a:cs typeface="B Lotus" panose="00000400000000000000" pitchFamily="2" charset="-78"/>
+                </a:rPr>
+                <a:t>B Lotus 14</a:t>
+              </a:r>
+              <a:r>
+                <a:rPr lang="ar-SA" sz="1400" b="1" dirty="0" smtClean="0">
+                  <a:cs typeface="B Lotus" panose="00000400000000000000" pitchFamily="2" charset="-78"/>
+                </a:rPr>
+                <a:t>پررنگ)</a:t>
+              </a:r>
+              <a:endParaRPr lang="en-US" sz="1400" b="1" dirty="0" smtClean="0">
+                <a:cs typeface="B Lotus" panose="00000400000000000000" pitchFamily="2" charset="-78"/>
+              </a:endParaRPr>
+            </a:p>
+            <a:p>
+              <a:pPr algn="r" rtl="1"/>
+              <a:endParaRPr lang="en-US" sz="100" b="1" dirty="0" smtClean="0">
+                <a:latin typeface="XB Kayhan" panose="02000503080000020003" pitchFamily="2" charset="-78"/>
+                <a:cs typeface="XB Kayhan" panose="02000503080000020003" pitchFamily="2" charset="-78"/>
+              </a:endParaRPr>
+            </a:p>
+            <a:p>
+              <a:pPr algn="just" rtl="1"/>
+              <a:r>
+                <a:rPr lang="fa-IR" sz="1100" dirty="0">
+                  <a:latin typeface="XB Kayhan" panose="02000503080000020003" pitchFamily="2" charset="-78"/>
+                  <a:cs typeface="XB Kayhan" panose="02000503080000020003" pitchFamily="2" charset="-78"/>
+                </a:rPr>
+                <a:t>متن آزمایشی</a:t>
+              </a:r>
+              <a:r>
+                <a:rPr lang="en-US" sz="1100" dirty="0">
+                  <a:latin typeface="XB Kayhan" panose="02000503080000020003" pitchFamily="2" charset="-78"/>
+                  <a:cs typeface="XB Kayhan" panose="02000503080000020003" pitchFamily="2" charset="-78"/>
+                </a:rPr>
+                <a:t> </a:t>
+              </a:r>
+              <a:r>
+                <a:rPr lang="ar-SA" sz="1100" dirty="0"/>
+                <a:t>(</a:t>
+              </a:r>
+              <a:r>
+                <a:rPr lang="en-US" sz="1100" dirty="0"/>
+                <a:t>B Lotus </a:t>
+              </a:r>
+              <a:r>
+                <a:rPr lang="en-US" sz="1100" dirty="0" smtClean="0"/>
+                <a:t>11</a:t>
+              </a:r>
+              <a:r>
+                <a:rPr lang="fa-IR" sz="1100" dirty="0" smtClean="0"/>
+                <a:t>)</a:t>
+              </a:r>
+              <a:r>
+                <a:rPr lang="fa-IR" sz="1100" dirty="0" smtClean="0">
+                  <a:latin typeface="XB Kayhan" panose="02000503080000020003" pitchFamily="2" charset="-78"/>
+                  <a:cs typeface="XB Kayhan" panose="02000503080000020003" pitchFamily="2" charset="-78"/>
+                </a:rPr>
+                <a:t> </a:t>
+              </a:r>
+              <a:r>
+                <a:rPr lang="fa-IR" sz="1100" dirty="0">
+                  <a:latin typeface="XB Kayhan" panose="02000503080000020003" pitchFamily="2" charset="-78"/>
+                  <a:cs typeface="XB Kayhan" panose="02000503080000020003" pitchFamily="2" charset="-78"/>
+                </a:rPr>
+                <a:t>متن آزمایشی متن آزمایشی متن آزمایشی متن آزمایشی متن آزمایشی متن آزمایشی متن آزمایشی متن آزمایشی متن آزمایشی متن</a:t>
+              </a:r>
+              <a:r>
+                <a:rPr lang="en-US" sz="1100" dirty="0"/>
+                <a:t> </a:t>
+              </a:r>
+              <a:r>
+                <a:rPr lang="fa-IR" sz="1100" dirty="0"/>
+                <a:t>متن متن متن </a:t>
+              </a:r>
+              <a:r>
+                <a:rPr lang="fa-IR" sz="1100" dirty="0">
+                  <a:latin typeface="XB Kayhan" panose="02000503080000020003" pitchFamily="2" charset="-78"/>
+                  <a:cs typeface="XB Kayhan" panose="02000503080000020003" pitchFamily="2" charset="-78"/>
+                </a:rPr>
+                <a:t>آزمایشی متن آزمایشی متن آزمایشی متن آزمایشی متن آزمایشی متن آزمایشی متن آزمایشی متن آزمایشی متن آزمایشی متن آزمایشی متن آزمایشی متن آزمایشی متن </a:t>
+              </a:r>
+              <a:endParaRPr lang="fa-IR" sz="1100" dirty="0">
                 <a:latin typeface="XB Kayhan" panose="02000503080000020003" pitchFamily="2" charset="-78"/>
                 <a:cs typeface="XB Kayhan" panose="02000503080000020003" pitchFamily="2" charset="-78"/>
               </a:endParaRPr>
@@ -3765,21 +3966,21 @@
       </p:grpSp>
       <p:grpSp>
         <p:nvGrpSpPr>
-          <p:cNvPr id="20" name="Group 19"/>
+          <p:cNvPr id="38" name="Group 37"/>
           <p:cNvGrpSpPr/>
           <p:nvPr/>
         </p:nvGrpSpPr>
         <p:grpSpPr>
           <a:xfrm>
-            <a:off x="228599" y="7152145"/>
-            <a:ext cx="6403957" cy="1881003"/>
+            <a:off x="228766" y="1652715"/>
+            <a:ext cx="6403957" cy="1394581"/>
             <a:chOff x="3449188" y="6597611"/>
             <a:chExt cx="3224298" cy="631393"/>
           </a:xfrm>
         </p:grpSpPr>
         <p:sp>
           <p:nvSpPr>
-            <p:cNvPr id="21" name="Rounded Rectangle 20"/>
+            <p:cNvPr id="39" name="Rounded Rectangle 38"/>
             <p:cNvSpPr/>
             <p:nvPr/>
           </p:nvSpPr>
@@ -3832,14 +4033,14 @@
         </p:sp>
         <p:sp>
           <p:nvSpPr>
-            <p:cNvPr id="22" name="TextBox 21"/>
+            <p:cNvPr id="40" name="TextBox 39"/>
             <p:cNvSpPr txBox="1"/>
             <p:nvPr/>
           </p:nvSpPr>
           <p:spPr>
             <a:xfrm>
               <a:off x="3449188" y="6627402"/>
-              <a:ext cx="3224298" cy="92980"/>
+              <a:ext cx="3224298" cy="444236"/>
             </a:xfrm>
             <a:prstGeom prst="rect">
               <a:avLst/>
@@ -3854,34 +4055,157 @@
             <a:p>
               <a:pPr algn="r" rtl="1"/>
               <a:r>
-                <a:rPr lang="fa-IR" sz="1200" b="1" dirty="0" smtClean="0">
-                  <a:solidFill>
-                    <a:srgbClr val="A00000"/>
-                  </a:solidFill>
-                  <a:latin typeface="XB Kayhan" panose="02000503080000020003" pitchFamily="2" charset="-78"/>
-                  <a:cs typeface="XB Kayhan" panose="02000503080000020003" pitchFamily="2" charset="-78"/>
-                </a:rPr>
-                <a:t>نحوه ثبت نام و ارسال مقاله</a:t>
-              </a:r>
+                <a:rPr lang="ar-SA" sz="1400" b="1" dirty="0">
+                  <a:cs typeface="B Lotus" panose="00000400000000000000" pitchFamily="2" charset="-78"/>
+                </a:rPr>
+                <a:t>عنوان </a:t>
+              </a:r>
+              <a:r>
+                <a:rPr lang="fa-IR" sz="1400" b="1" dirty="0">
+                  <a:cs typeface="B Lotus" panose="00000400000000000000" pitchFamily="2" charset="-78"/>
+                </a:rPr>
+                <a:t>بخش</a:t>
+              </a:r>
+              <a:r>
+                <a:rPr lang="ar-SA" sz="1400" b="1" dirty="0">
+                  <a:cs typeface="B Lotus" panose="00000400000000000000" pitchFamily="2" charset="-78"/>
+                </a:rPr>
+                <a:t> عنوان مقاله (</a:t>
+              </a:r>
+              <a:r>
+                <a:rPr lang="en-US" sz="1400" b="1" dirty="0">
+                  <a:cs typeface="B Lotus" panose="00000400000000000000" pitchFamily="2" charset="-78"/>
+                </a:rPr>
+                <a:t>B Lotus 14</a:t>
+              </a:r>
+              <a:r>
+                <a:rPr lang="ar-SA" sz="1400" b="1" dirty="0">
+                  <a:cs typeface="B Lotus" panose="00000400000000000000" pitchFamily="2" charset="-78"/>
+                </a:rPr>
+                <a:t>پررنگ)</a:t>
+              </a:r>
+              <a:endParaRPr lang="en-US" sz="1400" b="1" dirty="0">
+                <a:cs typeface="B Lotus" panose="00000400000000000000" pitchFamily="2" charset="-78"/>
+              </a:endParaRPr>
+            </a:p>
+            <a:p>
+              <a:pPr algn="just" rtl="1"/>
+              <a:r>
+                <a:rPr lang="fa-IR" sz="1100" dirty="0" smtClean="0">
+                  <a:latin typeface="XB Kayhan" panose="02000503080000020003" pitchFamily="2" charset="-78"/>
+                  <a:cs typeface="XB Kayhan" panose="02000503080000020003" pitchFamily="2" charset="-78"/>
+                </a:rPr>
+                <a:t>متن </a:t>
+              </a:r>
+              <a:r>
+                <a:rPr lang="fa-IR" sz="1100" dirty="0">
+                  <a:latin typeface="XB Kayhan" panose="02000503080000020003" pitchFamily="2" charset="-78"/>
+                  <a:cs typeface="XB Kayhan" panose="02000503080000020003" pitchFamily="2" charset="-78"/>
+                </a:rPr>
+                <a:t>آزمایشی</a:t>
+              </a:r>
+              <a:r>
+                <a:rPr lang="en-US" sz="1100" dirty="0">
+                  <a:latin typeface="XB Kayhan" panose="02000503080000020003" pitchFamily="2" charset="-78"/>
+                  <a:cs typeface="XB Kayhan" panose="02000503080000020003" pitchFamily="2" charset="-78"/>
+                </a:rPr>
+                <a:t> </a:t>
+              </a:r>
+              <a:r>
+                <a:rPr lang="ar-SA" sz="1100" dirty="0"/>
+                <a:t>(</a:t>
+              </a:r>
+              <a:r>
+                <a:rPr lang="en-US" sz="1100" dirty="0"/>
+                <a:t>B Lotus </a:t>
+              </a:r>
+              <a:r>
+                <a:rPr lang="en-US" sz="1100" dirty="0" smtClean="0"/>
+                <a:t>11</a:t>
+              </a:r>
+              <a:r>
+                <a:rPr lang="fa-IR" sz="1100" dirty="0" smtClean="0"/>
+                <a:t>)</a:t>
+              </a:r>
+              <a:r>
+                <a:rPr lang="fa-IR" sz="1100" dirty="0" smtClean="0">
+                  <a:latin typeface="XB Kayhan" panose="02000503080000020003" pitchFamily="2" charset="-78"/>
+                  <a:cs typeface="XB Kayhan" panose="02000503080000020003" pitchFamily="2" charset="-78"/>
+                </a:rPr>
+                <a:t> </a:t>
+              </a:r>
+              <a:r>
+                <a:rPr lang="fa-IR" sz="1100" dirty="0">
+                  <a:latin typeface="XB Kayhan" panose="02000503080000020003" pitchFamily="2" charset="-78"/>
+                  <a:cs typeface="XB Kayhan" panose="02000503080000020003" pitchFamily="2" charset="-78"/>
+                </a:rPr>
+                <a:t>متن آزمایشی متن آزمایشی متن آزمایشی متن آزمایشی متن آزمایشی متن آزمایشی متن آزمایشی متن آزمایشی متن آزمایشی متن</a:t>
+              </a:r>
+              <a:r>
+                <a:rPr lang="en-US" sz="1100" dirty="0"/>
+                <a:t> </a:t>
+              </a:r>
+              <a:r>
+                <a:rPr lang="fa-IR" sz="1100" dirty="0"/>
+                <a:t>متن متن متن </a:t>
+              </a:r>
+              <a:r>
+                <a:rPr lang="fa-IR" sz="1100" dirty="0">
+                  <a:latin typeface="XB Kayhan" panose="02000503080000020003" pitchFamily="2" charset="-78"/>
+                  <a:cs typeface="XB Kayhan" panose="02000503080000020003" pitchFamily="2" charset="-78"/>
+                </a:rPr>
+                <a:t>آزمایشی متن آزمایشی متن آزمایشی متن آزمایشی متن آزمایشی متن آزمایشی متن آزمایشی متن آزمایشی متن آزمایشی متن آزمایشی متن آزمایشی متن آزمایشی متن </a:t>
+              </a:r>
+            </a:p>
+            <a:p>
+              <a:pPr algn="just" rtl="1"/>
+              <a:r>
+                <a:rPr lang="fa-IR" sz="1100" dirty="0" smtClean="0">
+                  <a:latin typeface="XB Kayhan" panose="02000503080000020003" pitchFamily="2" charset="-78"/>
+                  <a:cs typeface="XB Kayhan" panose="02000503080000020003" pitchFamily="2" charset="-78"/>
+                </a:rPr>
+                <a:t>متن </a:t>
+              </a:r>
+              <a:r>
+                <a:rPr lang="fa-IR" sz="1100" dirty="0">
+                  <a:latin typeface="XB Kayhan" panose="02000503080000020003" pitchFamily="2" charset="-78"/>
+                  <a:cs typeface="XB Kayhan" panose="02000503080000020003" pitchFamily="2" charset="-78"/>
+                </a:rPr>
+                <a:t>آزمایشی متن آزمایشی متن آزمایشی متن آزمایشی متن آزمایشی متن آزمایشی متن آزمایشی متن آزمایشی متن آزمایشی متن آزمایشی متن آزمایشی متن آزمایشی متن آزمایشی متن آزمایشی متن آزمایشی متن آزمایشی متن آزمایشی متن آزمایشی متن آزمایشی متن آزمایشی متن آزمایشی متن ی متن آزمایشی </a:t>
+              </a:r>
+              <a:r>
+                <a:rPr lang="fa-IR" sz="1100" dirty="0" smtClean="0">
+                  <a:latin typeface="XB Kayhan" panose="02000503080000020003" pitchFamily="2" charset="-78"/>
+                  <a:cs typeface="XB Kayhan" panose="02000503080000020003" pitchFamily="2" charset="-78"/>
+                </a:rPr>
+                <a:t>متن</a:t>
+              </a:r>
+              <a:endParaRPr lang="fa-IR" sz="1100" dirty="0">
+                <a:latin typeface="XB Kayhan" panose="02000503080000020003" pitchFamily="2" charset="-78"/>
+                <a:cs typeface="XB Kayhan" panose="02000503080000020003" pitchFamily="2" charset="-78"/>
+              </a:endParaRPr>
             </a:p>
           </p:txBody>
         </p:sp>
       </p:grpSp>
       <p:sp>
         <p:nvSpPr>
-          <p:cNvPr id="23" name="TextBox 22"/>
+          <p:cNvPr id="41" name="TextBox 40"/>
           <p:cNvSpPr txBox="1"/>
           <p:nvPr/>
         </p:nvSpPr>
         <p:spPr>
           <a:xfrm>
-            <a:off x="2670209" y="1069306"/>
-            <a:ext cx="1534495" cy="338554"/>
+            <a:off x="243210" y="613387"/>
+            <a:ext cx="6371431" cy="923330"/>
           </a:xfrm>
           <a:prstGeom prst="rect">
             <a:avLst/>
           </a:prstGeom>
           <a:noFill/>
+          <a:ln>
+            <a:noFill/>
+          </a:ln>
         </p:spPr>
         <p:txBody>
           <a:bodyPr wrap="square" rtlCol="0">
@@ -3889,47 +4213,240 @@
           </a:bodyPr>
           <a:lstStyle/>
           <a:p>
-            <a:r>
-              <a:rPr lang="fa-IR" sz="1600" b="1" dirty="0" smtClean="0">
-                <a:latin typeface="XB Kayhan" panose="02000503080000020003" pitchFamily="2" charset="-78"/>
-                <a:cs typeface="XB Kayhan" panose="02000503080000020003" pitchFamily="2" charset="-78"/>
-              </a:rPr>
-              <a:t>16 تا 18 تیر 1400</a:t>
-            </a:r>
-            <a:endParaRPr lang="en-US" sz="1600" b="1" dirty="0" smtClean="0">
+            <a:pPr algn="r" rtl="1"/>
+            <a:endParaRPr lang="en-US" sz="100" b="1" dirty="0" smtClean="0">
               <a:latin typeface="XB Kayhan" panose="02000503080000020003" pitchFamily="2" charset="-78"/>
               <a:cs typeface="XB Kayhan" panose="02000503080000020003" pitchFamily="2" charset="-78"/>
+            </a:endParaRPr>
+          </a:p>
+          <a:p>
+            <a:pPr algn="r" rtl="1"/>
+            <a:endParaRPr lang="en-US" sz="100" b="1" dirty="0" smtClean="0">
+              <a:latin typeface="XB Kayhan" panose="02000503080000020003" pitchFamily="2" charset="-78"/>
+              <a:cs typeface="XB Kayhan" panose="02000503080000020003" pitchFamily="2" charset="-78"/>
+            </a:endParaRPr>
+          </a:p>
+          <a:p>
+            <a:pPr algn="r" rtl="1"/>
+            <a:endParaRPr lang="en-US" sz="100" b="1" dirty="0" smtClean="0">
+              <a:latin typeface="XB Kayhan" panose="02000503080000020003" pitchFamily="2" charset="-78"/>
+              <a:cs typeface="XB Kayhan" panose="02000503080000020003" pitchFamily="2" charset="-78"/>
+            </a:endParaRPr>
+          </a:p>
+          <a:p>
+            <a:pPr algn="r" rtl="1"/>
+            <a:endParaRPr lang="en-US" sz="100" b="1" dirty="0" smtClean="0">
+              <a:latin typeface="XB Kayhan" panose="02000503080000020003" pitchFamily="2" charset="-78"/>
+              <a:cs typeface="XB Kayhan" panose="02000503080000020003" pitchFamily="2" charset="-78"/>
+            </a:endParaRPr>
+          </a:p>
+          <a:p>
+            <a:pPr algn="r" rtl="1"/>
+            <a:endParaRPr lang="en-US" sz="100" b="1" dirty="0">
+              <a:latin typeface="XB Kayhan" panose="02000503080000020003" pitchFamily="2" charset="-78"/>
+              <a:cs typeface="XB Kayhan" panose="02000503080000020003" pitchFamily="2" charset="-78"/>
+            </a:endParaRPr>
+          </a:p>
+          <a:p>
+            <a:pPr algn="r" rtl="1"/>
+            <a:r>
+              <a:rPr lang="ar-SA" sz="1600" b="1" dirty="0">
+                <a:cs typeface="B Lotus" panose="00000400000000000000" pitchFamily="2" charset="-78"/>
+              </a:rPr>
+              <a:t>عنوان مقاله عنوان مقاله عنوان مقاله عنوان مقاله (</a:t>
+            </a:r>
+            <a:r>
+              <a:rPr lang="en-US" sz="1600" b="1" dirty="0">
+                <a:cs typeface="B Lotus" panose="00000400000000000000" pitchFamily="2" charset="-78"/>
+              </a:rPr>
+              <a:t>B Lotus 16</a:t>
+            </a:r>
+            <a:r>
+              <a:rPr lang="ar-SA" sz="1600" b="1" dirty="0">
+                <a:cs typeface="B Lotus" panose="00000400000000000000" pitchFamily="2" charset="-78"/>
+              </a:rPr>
+              <a:t>پررنگ)</a:t>
+            </a:r>
+            <a:endParaRPr lang="en-US" sz="1600" b="1" dirty="0">
+              <a:cs typeface="B Lotus" panose="00000400000000000000" pitchFamily="2" charset="-78"/>
+            </a:endParaRPr>
+          </a:p>
+          <a:p>
+            <a:pPr algn="r" rtl="1"/>
+            <a:endParaRPr lang="en-US" sz="100" b="1" dirty="0" smtClean="0">
+              <a:latin typeface="XB Kayhan" panose="02000503080000020003" pitchFamily="2" charset="-78"/>
+              <a:cs typeface="XB Kayhan" panose="02000503080000020003" pitchFamily="2" charset="-78"/>
+            </a:endParaRPr>
+          </a:p>
+          <a:p>
+            <a:pPr algn="r" rtl="1"/>
+            <a:r>
+              <a:rPr lang="ar-SA" sz="1200" b="1" dirty="0">
+                <a:cs typeface="B Lotus" panose="00000400000000000000" pitchFamily="2" charset="-78"/>
+              </a:rPr>
+              <a:t>نام خانوادگی</a:t>
+            </a:r>
+            <a:r>
+              <a:rPr lang="fa-IR" sz="1200" b="1" dirty="0">
+                <a:cs typeface="B Lotus" panose="00000400000000000000" pitchFamily="2" charset="-78"/>
+              </a:rPr>
+              <a:t>، نام</a:t>
+            </a:r>
+            <a:r>
+              <a:rPr lang="ar-SA" sz="1200" b="1" baseline="30000" dirty="0">
+                <a:cs typeface="B Lotus" panose="00000400000000000000" pitchFamily="2" charset="-78"/>
+              </a:rPr>
+              <a:t>1 </a:t>
+            </a:r>
+            <a:r>
+              <a:rPr lang="ar-SA" sz="1200" b="1" dirty="0">
+                <a:cs typeface="B Lotus" panose="00000400000000000000" pitchFamily="2" charset="-78"/>
+              </a:rPr>
+              <a:t>؛ نام خانوادگی، نام</a:t>
+            </a:r>
+            <a:r>
+              <a:rPr lang="ar-SA" sz="1200" b="1" baseline="30000" dirty="0">
+                <a:cs typeface="B Lotus" panose="00000400000000000000" pitchFamily="2" charset="-78"/>
+              </a:rPr>
+              <a:t>2   </a:t>
+            </a:r>
+            <a:r>
+              <a:rPr lang="ar-SA" sz="1200" b="1" dirty="0">
+                <a:cs typeface="B Lotus" panose="00000400000000000000" pitchFamily="2" charset="-78"/>
+              </a:rPr>
+              <a:t>(</a:t>
+            </a:r>
+            <a:r>
+              <a:rPr lang="en-US" sz="1200" b="1" dirty="0">
+                <a:cs typeface="B Lotus" panose="00000400000000000000" pitchFamily="2" charset="-78"/>
+              </a:rPr>
+              <a:t>B Lotus 12</a:t>
+            </a:r>
+            <a:r>
+              <a:rPr lang="ar-SA" sz="1200" b="1" dirty="0">
+                <a:cs typeface="B Lotus" panose="00000400000000000000" pitchFamily="2" charset="-78"/>
+              </a:rPr>
+              <a:t> پررنگ</a:t>
+            </a:r>
+            <a:r>
+              <a:rPr lang="ar-SA" sz="1200" b="1" dirty="0" smtClean="0">
+                <a:cs typeface="B Lotus" panose="00000400000000000000" pitchFamily="2" charset="-78"/>
+              </a:rPr>
+              <a:t>)</a:t>
+            </a:r>
+            <a:endParaRPr lang="fa-IR" sz="1200" b="1" dirty="0" smtClean="0">
+              <a:cs typeface="B Lotus" panose="00000400000000000000" pitchFamily="2" charset="-78"/>
+            </a:endParaRPr>
+          </a:p>
+          <a:p>
+            <a:pPr algn="r" rtl="1"/>
+            <a:r>
+              <a:rPr lang="fa-IR" sz="1000" baseline="30000" dirty="0">
+                <a:cs typeface="B Lotus" panose="00000400000000000000" pitchFamily="2" charset="-78"/>
+              </a:rPr>
+              <a:t>1</a:t>
+            </a:r>
+            <a:r>
+              <a:rPr lang="fa-IR" sz="1000" i="1" dirty="0">
+                <a:cs typeface="B Lotus" panose="00000400000000000000" pitchFamily="2" charset="-78"/>
+              </a:rPr>
+              <a:t> نام دانشگاه يا مؤسسه، نام دانشكده يا گروه</a:t>
+            </a:r>
+            <a:r>
+              <a:rPr lang="fa-IR" sz="1000" i="1" baseline="30000" dirty="0">
+                <a:cs typeface="B Lotus" panose="00000400000000000000" pitchFamily="2" charset="-78"/>
+              </a:rPr>
+              <a:t>  </a:t>
+            </a:r>
+            <a:r>
+              <a:rPr lang="ar-SA" sz="1000" i="1" dirty="0">
+                <a:cs typeface="B Lotus" panose="00000400000000000000" pitchFamily="2" charset="-78"/>
+              </a:rPr>
+              <a:t>(</a:t>
+            </a:r>
+            <a:r>
+              <a:rPr lang="en-US" sz="1000" i="1" dirty="0">
+                <a:cs typeface="B Lotus" panose="00000400000000000000" pitchFamily="2" charset="-78"/>
+              </a:rPr>
+              <a:t>B Lotus 10</a:t>
+            </a:r>
+            <a:r>
+              <a:rPr lang="ar-SA" sz="1000" i="1" dirty="0">
+                <a:cs typeface="B Lotus" panose="00000400000000000000" pitchFamily="2" charset="-78"/>
+              </a:rPr>
+              <a:t>)</a:t>
+            </a:r>
+            <a:endParaRPr lang="en-US" sz="1000" dirty="0">
+              <a:cs typeface="B Lotus" panose="00000400000000000000" pitchFamily="2" charset="-78"/>
+            </a:endParaRPr>
+          </a:p>
+          <a:p>
+            <a:pPr algn="r" rtl="1"/>
+            <a:r>
+              <a:rPr lang="fa-IR" sz="1000" i="1" baseline="30000" dirty="0">
+                <a:cs typeface="B Lotus" panose="00000400000000000000" pitchFamily="2" charset="-78"/>
+              </a:rPr>
+              <a:t>2 </a:t>
+            </a:r>
+            <a:r>
+              <a:rPr lang="fa-IR" sz="1000" i="1" dirty="0">
+                <a:cs typeface="B Lotus" panose="00000400000000000000" pitchFamily="2" charset="-78"/>
+              </a:rPr>
+              <a:t>نام دانشگاه یا موسسه، نام دانشکده یا گروه </a:t>
+            </a:r>
+            <a:r>
+              <a:rPr lang="ar-SA" sz="1000" i="1" dirty="0">
+                <a:cs typeface="B Lotus" panose="00000400000000000000" pitchFamily="2" charset="-78"/>
+              </a:rPr>
+              <a:t>(</a:t>
+            </a:r>
+            <a:r>
+              <a:rPr lang="en-US" sz="1000" i="1" dirty="0">
+                <a:cs typeface="B Lotus" panose="00000400000000000000" pitchFamily="2" charset="-78"/>
+              </a:rPr>
+              <a:t>B Lotus 10</a:t>
+            </a:r>
+            <a:r>
+              <a:rPr lang="ar-SA" sz="1000" i="1" dirty="0" smtClean="0">
+                <a:cs typeface="B Lotus" panose="00000400000000000000" pitchFamily="2" charset="-78"/>
+              </a:rPr>
+              <a:t>)</a:t>
+            </a:r>
+            <a:endParaRPr lang="en-US" sz="1200" dirty="0">
+              <a:cs typeface="B Lotus" panose="00000400000000000000" pitchFamily="2" charset="-78"/>
             </a:endParaRPr>
           </a:p>
         </p:txBody>
       </p:sp>
       <p:grpSp>
         <p:nvGrpSpPr>
-          <p:cNvPr id="25" name="Group 24"/>
+          <p:cNvPr id="42" name="Group 41"/>
           <p:cNvGrpSpPr/>
           <p:nvPr/>
         </p:nvGrpSpPr>
         <p:grpSpPr>
           <a:xfrm>
-            <a:off x="228600" y="9102019"/>
-            <a:ext cx="6400799" cy="560140"/>
-            <a:chOff x="3449188" y="6789335"/>
-            <a:chExt cx="3224298" cy="768093"/>
+            <a:off x="243210" y="4853326"/>
+            <a:ext cx="6403957" cy="2966963"/>
+            <a:chOff x="3449188" y="6597611"/>
+            <a:chExt cx="3224298" cy="631393"/>
           </a:xfrm>
         </p:grpSpPr>
         <p:sp>
           <p:nvSpPr>
-            <p:cNvPr id="26" name="Rounded Rectangle 25"/>
+            <p:cNvPr id="43" name="Rounded Rectangle 42"/>
             <p:cNvSpPr/>
             <p:nvPr/>
           </p:nvSpPr>
           <p:spPr>
             <a:xfrm>
-              <a:off x="3449188" y="6789335"/>
-              <a:ext cx="3224298" cy="768093"/>
+              <a:off x="3449188" y="6597611"/>
+              <a:ext cx="3224298" cy="631393"/>
             </a:xfrm>
             <a:prstGeom prst="roundRect">
-              <a:avLst/>
+              <a:avLst>
+                <a:gd name="adj" fmla="val 4268"/>
+              </a:avLst>
             </a:prstGeom>
             <a:solidFill>
               <a:schemeClr val="accent3">
@@ -3970,14 +4487,14 @@
         </p:sp>
         <p:sp>
           <p:nvSpPr>
-            <p:cNvPr id="27" name="TextBox 26"/>
+            <p:cNvPr id="44" name="TextBox 43"/>
             <p:cNvSpPr txBox="1"/>
             <p:nvPr/>
           </p:nvSpPr>
           <p:spPr>
             <a:xfrm>
-              <a:off x="3449188" y="6862307"/>
-              <a:ext cx="3224298" cy="646331"/>
+              <a:off x="3449188" y="6627402"/>
+              <a:ext cx="3224298" cy="573375"/>
             </a:xfrm>
             <a:prstGeom prst="rect">
               <a:avLst/>
@@ -3992,64 +4509,757 @@
             <a:p>
               <a:pPr algn="r" rtl="1"/>
               <a:r>
-                <a:rPr lang="fa-IR" sz="1200" dirty="0" smtClean="0">
-                  <a:latin typeface="XB Kayhan" panose="02000503080000020003" pitchFamily="2" charset="-78"/>
-                  <a:cs typeface="XB Kayhan" panose="02000503080000020003" pitchFamily="2" charset="-78"/>
-                </a:rPr>
-                <a:t>نشانی دبیرخانه: زنجان، دانشگاه تحصیلات تکمیلی علوم پایه، صندوق پستی: 1159-45195</a:t>
-              </a:r>
-            </a:p>
-            <a:p>
-              <a:pPr algn="ctr" rtl="1"/>
-              <a:r>
-                <a:rPr lang="fa-IR" sz="1200" b="1" dirty="0" smtClean="0">
-                  <a:latin typeface="XB Kayhan" panose="02000503080000020003" pitchFamily="2" charset="-78"/>
-                  <a:cs typeface="XB Kayhan" panose="02000503080000020003" pitchFamily="2" charset="-78"/>
-                </a:rPr>
-                <a:t>تلفن</a:t>
-              </a:r>
-              <a:r>
-                <a:rPr lang="fa-IR" sz="1200" dirty="0" smtClean="0">
-                  <a:latin typeface="XB Kayhan" panose="02000503080000020003" pitchFamily="2" charset="-78"/>
-                  <a:cs typeface="XB Kayhan" panose="02000503080000020003" pitchFamily="2" charset="-78"/>
-                </a:rPr>
-                <a:t>:</a:t>
-              </a:r>
-              <a:r>
-                <a:rPr lang="en-US" sz="1200" dirty="0" smtClean="0">
+                <a:rPr lang="ar-SA" sz="1400" b="1" dirty="0">
+                  <a:cs typeface="B Lotus" panose="00000400000000000000" pitchFamily="2" charset="-78"/>
+                </a:rPr>
+                <a:t>عنوان </a:t>
+              </a:r>
+              <a:r>
+                <a:rPr lang="fa-IR" sz="1400" b="1" dirty="0">
+                  <a:cs typeface="B Lotus" panose="00000400000000000000" pitchFamily="2" charset="-78"/>
+                </a:rPr>
+                <a:t>بخش</a:t>
+              </a:r>
+              <a:r>
+                <a:rPr lang="ar-SA" sz="1400" b="1" dirty="0">
+                  <a:cs typeface="B Lotus" panose="00000400000000000000" pitchFamily="2" charset="-78"/>
+                </a:rPr>
+                <a:t> عنوان مقاله (</a:t>
+              </a:r>
+              <a:r>
+                <a:rPr lang="en-US" sz="1400" b="1" dirty="0">
+                  <a:cs typeface="B Lotus" panose="00000400000000000000" pitchFamily="2" charset="-78"/>
+                </a:rPr>
+                <a:t>B Lotus 14</a:t>
+              </a:r>
+              <a:r>
+                <a:rPr lang="ar-SA" sz="1400" b="1" dirty="0">
+                  <a:cs typeface="B Lotus" panose="00000400000000000000" pitchFamily="2" charset="-78"/>
+                </a:rPr>
+                <a:t>پررنگ)</a:t>
+              </a:r>
+              <a:endParaRPr lang="en-US" sz="1400" b="1" dirty="0">
+                <a:cs typeface="B Lotus" panose="00000400000000000000" pitchFamily="2" charset="-78"/>
+              </a:endParaRPr>
+            </a:p>
+            <a:p>
+              <a:pPr algn="just" rtl="1"/>
+              <a:r>
+                <a:rPr lang="fa-IR" sz="1100" dirty="0" smtClean="0">
+                  <a:latin typeface="XB Kayhan" panose="02000503080000020003" pitchFamily="2" charset="-78"/>
+                  <a:cs typeface="XB Kayhan" panose="02000503080000020003" pitchFamily="2" charset="-78"/>
+                </a:rPr>
+                <a:t>متن </a:t>
+              </a:r>
+              <a:r>
+                <a:rPr lang="fa-IR" sz="1100" dirty="0">
+                  <a:latin typeface="XB Kayhan" panose="02000503080000020003" pitchFamily="2" charset="-78"/>
+                  <a:cs typeface="XB Kayhan" panose="02000503080000020003" pitchFamily="2" charset="-78"/>
+                </a:rPr>
+                <a:t>آزمایشی</a:t>
+              </a:r>
+              <a:r>
+                <a:rPr lang="en-US" sz="1100" dirty="0">
                   <a:latin typeface="XB Kayhan" panose="02000503080000020003" pitchFamily="2" charset="-78"/>
                   <a:cs typeface="XB Kayhan" panose="02000503080000020003" pitchFamily="2" charset="-78"/>
                 </a:rPr>
                 <a:t> </a:t>
               </a:r>
               <a:r>
-                <a:rPr lang="fa-IR" sz="1200" dirty="0" smtClean="0">
-                  <a:latin typeface="XB Kayhan" panose="02000503080000020003" pitchFamily="2" charset="-78"/>
-                  <a:cs typeface="XB Kayhan" panose="02000503080000020003" pitchFamily="2" charset="-78"/>
-                </a:rPr>
-                <a:t>33152212-024     </a:t>
-              </a:r>
-              <a:r>
-                <a:rPr lang="fa-IR" sz="1200" b="1" dirty="0" smtClean="0">
-                  <a:latin typeface="XB Kayhan" panose="02000503080000020003" pitchFamily="2" charset="-78"/>
-                  <a:cs typeface="XB Kayhan" panose="02000503080000020003" pitchFamily="2" charset="-78"/>
-                </a:rPr>
-                <a:t>فکس</a:t>
-              </a:r>
-              <a:r>
-                <a:rPr lang="fa-IR" sz="1200" dirty="0" smtClean="0">
-                  <a:latin typeface="XB Kayhan" panose="02000503080000020003" pitchFamily="2" charset="-78"/>
-                  <a:cs typeface="XB Kayhan" panose="02000503080000020003" pitchFamily="2" charset="-78"/>
-                </a:rPr>
-                <a:t>: 33152104-024</a:t>
-              </a:r>
-              <a:endParaRPr lang="en-US" sz="1200" dirty="0" smtClean="0">
-                <a:latin typeface="XB Kayhan" panose="02000503080000020003" pitchFamily="2" charset="-78"/>
-                <a:cs typeface="XB Kayhan" panose="02000503080000020003" pitchFamily="2" charset="-78"/>
-              </a:endParaRPr>
-            </a:p>
-            <a:p>
-              <a:endParaRPr lang="en-US" sz="1200" dirty="0" smtClean="0"/>
+                <a:rPr lang="ar-SA" sz="1100" dirty="0"/>
+                <a:t>(</a:t>
+              </a:r>
+              <a:r>
+                <a:rPr lang="en-US" sz="1100" dirty="0"/>
+                <a:t>B Lotus </a:t>
+              </a:r>
+              <a:r>
+                <a:rPr lang="en-US" sz="1100" dirty="0" smtClean="0"/>
+                <a:t>11</a:t>
+              </a:r>
+              <a:r>
+                <a:rPr lang="fa-IR" sz="1100" dirty="0" smtClean="0"/>
+                <a:t>)</a:t>
+              </a:r>
+              <a:r>
+                <a:rPr lang="fa-IR" sz="1100" dirty="0" smtClean="0">
+                  <a:latin typeface="XB Kayhan" panose="02000503080000020003" pitchFamily="2" charset="-78"/>
+                  <a:cs typeface="XB Kayhan" panose="02000503080000020003" pitchFamily="2" charset="-78"/>
+                </a:rPr>
+                <a:t> </a:t>
+              </a:r>
+              <a:r>
+                <a:rPr lang="fa-IR" sz="1100" dirty="0">
+                  <a:latin typeface="XB Kayhan" panose="02000503080000020003" pitchFamily="2" charset="-78"/>
+                  <a:cs typeface="XB Kayhan" panose="02000503080000020003" pitchFamily="2" charset="-78"/>
+                </a:rPr>
+                <a:t>متن آزمایشی متن آزمایشی متن آزمایشی متن آزمایشی متن آزمایشی متن آزمایشی متن آزمایشی متن آزمایشی متن آزمایشی متن</a:t>
+              </a:r>
+              <a:r>
+                <a:rPr lang="en-US" sz="1100" dirty="0"/>
+                <a:t> </a:t>
+              </a:r>
+              <a:r>
+                <a:rPr lang="fa-IR" sz="1100" dirty="0"/>
+                <a:t>متن متن متن </a:t>
+              </a:r>
+              <a:r>
+                <a:rPr lang="fa-IR" sz="1100" dirty="0">
+                  <a:latin typeface="XB Kayhan" panose="02000503080000020003" pitchFamily="2" charset="-78"/>
+                  <a:cs typeface="XB Kayhan" panose="02000503080000020003" pitchFamily="2" charset="-78"/>
+                </a:rPr>
+                <a:t>آزمایشی متن آزمایشی متن آزمایشی متن آزمایشی متن آزمایشی متن آزمایشی متن آزمایشی متن آزمایشی متن آزمایشی متن آزمایشی متن آزمایشی متن آزمایشی متن </a:t>
+              </a:r>
+            </a:p>
+            <a:p>
+              <a:pPr algn="just" rtl="1"/>
+              <a:r>
+                <a:rPr lang="fa-IR" sz="1100" dirty="0" smtClean="0">
+                  <a:latin typeface="XB Kayhan" panose="02000503080000020003" pitchFamily="2" charset="-78"/>
+                  <a:cs typeface="XB Kayhan" panose="02000503080000020003" pitchFamily="2" charset="-78"/>
+                </a:rPr>
+                <a:t>متن </a:t>
+              </a:r>
+              <a:r>
+                <a:rPr lang="fa-IR" sz="1100" dirty="0">
+                  <a:latin typeface="XB Kayhan" panose="02000503080000020003" pitchFamily="2" charset="-78"/>
+                  <a:cs typeface="XB Kayhan" panose="02000503080000020003" pitchFamily="2" charset="-78"/>
+                </a:rPr>
+                <a:t>آزمایشی متن آزمایشی متن آزمایشی متن آزمایشی متن آزمایشی متن آزمایشی متن آزمایشی متن آزمایشی متن آزمایشی متن آزمایشی متن آزمایشی متن آزمایشی متن آزمایشی متن آزمایشی متن آزمایشی متن آزمایشی متن آزمایشی متن آزمایشی متن آزمایشی متن آزمایشی متن آزمایشی متن ی متن آزمایشی متن</a:t>
+              </a:r>
+            </a:p>
+            <a:p>
+              <a:pPr algn="just" rtl="1"/>
+              <a:r>
+                <a:rPr lang="fa-IR" sz="1100" dirty="0">
+                  <a:latin typeface="XB Kayhan" panose="02000503080000020003" pitchFamily="2" charset="-78"/>
+                  <a:cs typeface="XB Kayhan" panose="02000503080000020003" pitchFamily="2" charset="-78"/>
+                </a:rPr>
+                <a:t>متن آزمایشی متن آزمایشی متن آزمایشی متن آزمایشی متن آزمایشی متن آزمایشی متن آزمایشی متن آزمایشی متن آزمایشی متن آزمایشی متن آزمایشی متن آزمایشی متن آزمایشی متن آزمایشی متن آزمایشی متن آزمایشی متن </a:t>
+              </a:r>
+              <a:r>
+                <a:rPr lang="fa-IR" sz="1100" dirty="0" smtClean="0">
+                  <a:latin typeface="XB Kayhan" panose="02000503080000020003" pitchFamily="2" charset="-78"/>
+                  <a:cs typeface="XB Kayhan" panose="02000503080000020003" pitchFamily="2" charset="-78"/>
+                </a:rPr>
+                <a:t>آزمایشی</a:t>
+              </a:r>
+              <a:endParaRPr lang="fa-IR" sz="1100" b="1" dirty="0" smtClean="0">
+                <a:solidFill>
+                  <a:srgbClr val="A00000"/>
+                </a:solidFill>
+                <a:latin typeface="XB Kayhan" panose="02000503080000020003" pitchFamily="2" charset="-78"/>
+                <a:cs typeface="XB Kayhan" panose="02000503080000020003" pitchFamily="2" charset="-78"/>
+              </a:endParaRPr>
+            </a:p>
+          </p:txBody>
+        </p:sp>
+      </p:grpSp>
+      <p:grpSp>
+        <p:nvGrpSpPr>
+          <p:cNvPr id="45" name="Group 44"/>
+          <p:cNvGrpSpPr/>
+          <p:nvPr/>
+        </p:nvGrpSpPr>
+        <p:grpSpPr>
+          <a:xfrm>
+            <a:off x="3504083" y="7910682"/>
+            <a:ext cx="3147060" cy="1715637"/>
+            <a:chOff x="228600" y="5845235"/>
+            <a:chExt cx="3147060" cy="1736853"/>
+          </a:xfrm>
+        </p:grpSpPr>
+        <p:sp>
+          <p:nvSpPr>
+            <p:cNvPr id="46" name="Rounded Rectangle 45"/>
+            <p:cNvSpPr/>
+            <p:nvPr/>
+          </p:nvSpPr>
+          <p:spPr>
+            <a:xfrm>
+              <a:off x="228600" y="5845235"/>
+              <a:ext cx="3147060" cy="1736853"/>
+            </a:xfrm>
+            <a:prstGeom prst="roundRect">
+              <a:avLst>
+                <a:gd name="adj" fmla="val 6909"/>
+              </a:avLst>
+            </a:prstGeom>
+            <a:solidFill>
+              <a:schemeClr val="accent3">
+                <a:lumMod val="20000"/>
+                <a:lumOff val="80000"/>
+              </a:schemeClr>
+            </a:solidFill>
+            <a:ln w="19050">
+              <a:solidFill>
+                <a:srgbClr val="C00000"/>
+              </a:solidFill>
+            </a:ln>
+          </p:spPr>
+          <p:style>
+            <a:lnRef idx="2">
+              <a:schemeClr val="accent1">
+                <a:shade val="50000"/>
+              </a:schemeClr>
+            </a:lnRef>
+            <a:fillRef idx="1">
+              <a:schemeClr val="accent1"/>
+            </a:fillRef>
+            <a:effectRef idx="0">
+              <a:schemeClr val="accent1"/>
+            </a:effectRef>
+            <a:fontRef idx="minor">
+              <a:schemeClr val="lt1"/>
+            </a:fontRef>
+          </p:style>
+          <p:txBody>
+            <a:bodyPr rtlCol="0" anchor="ctr"/>
+            <a:lstStyle/>
+            <a:p>
+              <a:pPr algn="ctr"/>
+              <a:endParaRPr lang="en-US"/>
+            </a:p>
+          </p:txBody>
+        </p:sp>
+        <p:sp>
+          <p:nvSpPr>
+            <p:cNvPr id="47" name="TextBox 46"/>
+            <p:cNvSpPr txBox="1"/>
+            <p:nvPr/>
+          </p:nvSpPr>
+          <p:spPr>
+            <a:xfrm>
+              <a:off x="334325" y="5917366"/>
+              <a:ext cx="2955925" cy="1564816"/>
+            </a:xfrm>
+            <a:prstGeom prst="rect">
+              <a:avLst/>
+            </a:prstGeom>
+            <a:noFill/>
+            <a:ln>
+              <a:noFill/>
+            </a:ln>
+          </p:spPr>
+          <p:txBody>
+            <a:bodyPr wrap="square" rtlCol="0">
+              <a:spAutoFit/>
+            </a:bodyPr>
+            <a:lstStyle/>
+            <a:p>
+              <a:pPr algn="r" rtl="1"/>
+              <a:endParaRPr lang="en-US" sz="100" b="1" dirty="0" smtClean="0">
+                <a:latin typeface="XB Kayhan" panose="02000503080000020003" pitchFamily="2" charset="-78"/>
+                <a:cs typeface="XB Kayhan" panose="02000503080000020003" pitchFamily="2" charset="-78"/>
+              </a:endParaRPr>
+            </a:p>
+            <a:p>
+              <a:pPr algn="r" rtl="1"/>
+              <a:endParaRPr lang="en-US" sz="100" b="1" dirty="0" smtClean="0">
+                <a:latin typeface="XB Kayhan" panose="02000503080000020003" pitchFamily="2" charset="-78"/>
+                <a:cs typeface="XB Kayhan" panose="02000503080000020003" pitchFamily="2" charset="-78"/>
+              </a:endParaRPr>
+            </a:p>
+            <a:p>
+              <a:pPr algn="r" rtl="1"/>
+              <a:endParaRPr lang="en-US" sz="100" b="1" dirty="0" smtClean="0">
+                <a:latin typeface="XB Kayhan" panose="02000503080000020003" pitchFamily="2" charset="-78"/>
+                <a:cs typeface="XB Kayhan" panose="02000503080000020003" pitchFamily="2" charset="-78"/>
+              </a:endParaRPr>
+            </a:p>
+            <a:p>
+              <a:pPr algn="r" rtl="1"/>
+              <a:endParaRPr lang="en-US" sz="100" b="1" dirty="0" smtClean="0">
+                <a:latin typeface="XB Kayhan" panose="02000503080000020003" pitchFamily="2" charset="-78"/>
+                <a:cs typeface="XB Kayhan" panose="02000503080000020003" pitchFamily="2" charset="-78"/>
+              </a:endParaRPr>
+            </a:p>
+            <a:p>
+              <a:pPr algn="r" rtl="1"/>
+              <a:endParaRPr lang="en-US" sz="100" b="1" dirty="0">
+                <a:latin typeface="XB Kayhan" panose="02000503080000020003" pitchFamily="2" charset="-78"/>
+                <a:cs typeface="XB Kayhan" panose="02000503080000020003" pitchFamily="2" charset="-78"/>
+              </a:endParaRPr>
+            </a:p>
+            <a:p>
+              <a:pPr algn="r" rtl="1"/>
+              <a:r>
+                <a:rPr lang="ar-SA" sz="1400" b="1" dirty="0" smtClean="0">
+                  <a:cs typeface="B Lotus" panose="00000400000000000000" pitchFamily="2" charset="-78"/>
+                </a:rPr>
+                <a:t>عنوان </a:t>
+              </a:r>
+              <a:r>
+                <a:rPr lang="fa-IR" sz="1400" b="1" dirty="0" smtClean="0">
+                  <a:cs typeface="B Lotus" panose="00000400000000000000" pitchFamily="2" charset="-78"/>
+                </a:rPr>
+                <a:t>بخش</a:t>
+              </a:r>
+              <a:r>
+                <a:rPr lang="ar-SA" sz="1400" b="1" dirty="0" smtClean="0">
+                  <a:cs typeface="B Lotus" panose="00000400000000000000" pitchFamily="2" charset="-78"/>
+                </a:rPr>
+                <a:t> </a:t>
+              </a:r>
+              <a:r>
+                <a:rPr lang="ar-SA" sz="1400" b="1" dirty="0">
+                  <a:cs typeface="B Lotus" panose="00000400000000000000" pitchFamily="2" charset="-78"/>
+                </a:rPr>
+                <a:t>عنوان مقاله (</a:t>
+              </a:r>
+              <a:r>
+                <a:rPr lang="en-US" sz="1400" b="1" dirty="0">
+                  <a:cs typeface="B Lotus" panose="00000400000000000000" pitchFamily="2" charset="-78"/>
+                </a:rPr>
+                <a:t>B Lotus </a:t>
+              </a:r>
+              <a:r>
+                <a:rPr lang="en-US" sz="1400" b="1" dirty="0" smtClean="0">
+                  <a:cs typeface="B Lotus" panose="00000400000000000000" pitchFamily="2" charset="-78"/>
+                </a:rPr>
+                <a:t>1</a:t>
+              </a:r>
+              <a:r>
+                <a:rPr lang="en-US" sz="1400" b="1" dirty="0">
+                  <a:cs typeface="B Lotus" panose="00000400000000000000" pitchFamily="2" charset="-78"/>
+                </a:rPr>
+                <a:t>4</a:t>
+              </a:r>
+              <a:r>
+                <a:rPr lang="ar-SA" sz="1400" b="1" dirty="0" smtClean="0">
+                  <a:cs typeface="B Lotus" panose="00000400000000000000" pitchFamily="2" charset="-78"/>
+                </a:rPr>
+                <a:t>پررنگ</a:t>
+              </a:r>
+              <a:r>
+                <a:rPr lang="ar-SA" sz="1400" b="1" dirty="0">
+                  <a:cs typeface="B Lotus" panose="00000400000000000000" pitchFamily="2" charset="-78"/>
+                </a:rPr>
+                <a:t>)</a:t>
+              </a:r>
+              <a:endParaRPr lang="en-US" sz="1400" b="1" dirty="0">
+                <a:cs typeface="B Lotus" panose="00000400000000000000" pitchFamily="2" charset="-78"/>
+              </a:endParaRPr>
+            </a:p>
+            <a:p>
+              <a:pPr algn="r" rtl="1"/>
+              <a:endParaRPr lang="en-US" sz="100" b="1" dirty="0" smtClean="0">
+                <a:latin typeface="XB Kayhan" panose="02000503080000020003" pitchFamily="2" charset="-78"/>
+                <a:cs typeface="XB Kayhan" panose="02000503080000020003" pitchFamily="2" charset="-78"/>
+              </a:endParaRPr>
+            </a:p>
+            <a:p>
+              <a:pPr algn="just" rtl="1"/>
+              <a:r>
+                <a:rPr lang="fa-IR" sz="1100" dirty="0">
+                  <a:latin typeface="XB Kayhan" panose="02000503080000020003" pitchFamily="2" charset="-78"/>
+                  <a:cs typeface="XB Kayhan" panose="02000503080000020003" pitchFamily="2" charset="-78"/>
+                </a:rPr>
+                <a:t>متن </a:t>
+              </a:r>
+              <a:r>
+                <a:rPr lang="fa-IR" sz="1100" dirty="0" smtClean="0">
+                  <a:latin typeface="XB Kayhan" panose="02000503080000020003" pitchFamily="2" charset="-78"/>
+                  <a:cs typeface="XB Kayhan" panose="02000503080000020003" pitchFamily="2" charset="-78"/>
+                </a:rPr>
+                <a:t>آزمایشی</a:t>
+              </a:r>
+              <a:r>
+                <a:rPr lang="en-US" sz="1100" dirty="0" smtClean="0">
+                  <a:latin typeface="XB Kayhan" panose="02000503080000020003" pitchFamily="2" charset="-78"/>
+                  <a:cs typeface="XB Kayhan" panose="02000503080000020003" pitchFamily="2" charset="-78"/>
+                </a:rPr>
+                <a:t> </a:t>
+              </a:r>
+              <a:r>
+                <a:rPr lang="ar-SA" sz="1100" dirty="0"/>
+                <a:t>(</a:t>
+              </a:r>
+              <a:r>
+                <a:rPr lang="en-US" sz="1100" dirty="0"/>
+                <a:t>B Lotus </a:t>
+              </a:r>
+              <a:r>
+                <a:rPr lang="en-US" sz="1100" dirty="0" smtClean="0"/>
+                <a:t>11</a:t>
+              </a:r>
+              <a:r>
+                <a:rPr lang="fa-IR" sz="1100" dirty="0" smtClean="0"/>
+                <a:t>)</a:t>
+              </a:r>
+              <a:r>
+                <a:rPr lang="fa-IR" sz="1100" dirty="0" smtClean="0">
+                  <a:latin typeface="XB Kayhan" panose="02000503080000020003" pitchFamily="2" charset="-78"/>
+                  <a:cs typeface="XB Kayhan" panose="02000503080000020003" pitchFamily="2" charset="-78"/>
+                </a:rPr>
+                <a:t> </a:t>
+              </a:r>
+              <a:r>
+                <a:rPr lang="fa-IR" sz="1100" dirty="0">
+                  <a:latin typeface="XB Kayhan" panose="02000503080000020003" pitchFamily="2" charset="-78"/>
+                  <a:cs typeface="XB Kayhan" panose="02000503080000020003" pitchFamily="2" charset="-78"/>
+                </a:rPr>
+                <a:t>متن </a:t>
+              </a:r>
+              <a:r>
+                <a:rPr lang="fa-IR" sz="1100" dirty="0" smtClean="0">
+                  <a:latin typeface="XB Kayhan" panose="02000503080000020003" pitchFamily="2" charset="-78"/>
+                  <a:cs typeface="XB Kayhan" panose="02000503080000020003" pitchFamily="2" charset="-78"/>
+                </a:rPr>
+                <a:t>آزمایشی</a:t>
+              </a:r>
+              <a:r>
+                <a:rPr lang="fa-IR" sz="1100" dirty="0">
+                  <a:latin typeface="XB Kayhan" panose="02000503080000020003" pitchFamily="2" charset="-78"/>
+                  <a:cs typeface="XB Kayhan" panose="02000503080000020003" pitchFamily="2" charset="-78"/>
+                </a:rPr>
+                <a:t> متن آزمایشی متن </a:t>
+              </a:r>
+              <a:r>
+                <a:rPr lang="fa-IR" sz="1100" dirty="0" smtClean="0">
+                  <a:latin typeface="XB Kayhan" panose="02000503080000020003" pitchFamily="2" charset="-78"/>
+                  <a:cs typeface="XB Kayhan" panose="02000503080000020003" pitchFamily="2" charset="-78"/>
+                </a:rPr>
+                <a:t>آزمایشی</a:t>
+              </a:r>
+              <a:r>
+                <a:rPr lang="fa-IR" sz="1100" dirty="0">
+                  <a:latin typeface="XB Kayhan" panose="02000503080000020003" pitchFamily="2" charset="-78"/>
+                  <a:cs typeface="XB Kayhan" panose="02000503080000020003" pitchFamily="2" charset="-78"/>
+                </a:rPr>
+                <a:t> متن آزمایشی متن </a:t>
+              </a:r>
+              <a:r>
+                <a:rPr lang="fa-IR" sz="1100" dirty="0" smtClean="0">
+                  <a:latin typeface="XB Kayhan" panose="02000503080000020003" pitchFamily="2" charset="-78"/>
+                  <a:cs typeface="XB Kayhan" panose="02000503080000020003" pitchFamily="2" charset="-78"/>
+                </a:rPr>
+                <a:t>آزمایشی</a:t>
+              </a:r>
+              <a:r>
+                <a:rPr lang="fa-IR" sz="1100" dirty="0">
+                  <a:latin typeface="XB Kayhan" panose="02000503080000020003" pitchFamily="2" charset="-78"/>
+                  <a:cs typeface="XB Kayhan" panose="02000503080000020003" pitchFamily="2" charset="-78"/>
+                </a:rPr>
+                <a:t> متن آزمایشی متن </a:t>
+              </a:r>
+              <a:r>
+                <a:rPr lang="fa-IR" sz="1100" dirty="0" smtClean="0">
+                  <a:latin typeface="XB Kayhan" panose="02000503080000020003" pitchFamily="2" charset="-78"/>
+                  <a:cs typeface="XB Kayhan" panose="02000503080000020003" pitchFamily="2" charset="-78"/>
+                </a:rPr>
+                <a:t>آزمایشی</a:t>
+              </a:r>
+              <a:r>
+                <a:rPr lang="fa-IR" sz="1100" dirty="0">
+                  <a:latin typeface="XB Kayhan" panose="02000503080000020003" pitchFamily="2" charset="-78"/>
+                  <a:cs typeface="XB Kayhan" panose="02000503080000020003" pitchFamily="2" charset="-78"/>
+                </a:rPr>
+                <a:t> متن آزمایشی متن </a:t>
+              </a:r>
+              <a:r>
+                <a:rPr lang="fa-IR" sz="1100" dirty="0" smtClean="0">
+                  <a:latin typeface="XB Kayhan" panose="02000503080000020003" pitchFamily="2" charset="-78"/>
+                  <a:cs typeface="XB Kayhan" panose="02000503080000020003" pitchFamily="2" charset="-78"/>
+                </a:rPr>
+                <a:t>آزمایشی</a:t>
+              </a:r>
+              <a:r>
+                <a:rPr lang="fa-IR" sz="1100" dirty="0">
+                  <a:latin typeface="XB Kayhan" panose="02000503080000020003" pitchFamily="2" charset="-78"/>
+                  <a:cs typeface="XB Kayhan" panose="02000503080000020003" pitchFamily="2" charset="-78"/>
+                </a:rPr>
+                <a:t> </a:t>
+              </a:r>
+              <a:r>
+                <a:rPr lang="fa-IR" sz="1100" dirty="0" smtClean="0">
+                  <a:latin typeface="XB Kayhan" panose="02000503080000020003" pitchFamily="2" charset="-78"/>
+                  <a:cs typeface="XB Kayhan" panose="02000503080000020003" pitchFamily="2" charset="-78"/>
+                </a:rPr>
+                <a:t>متن</a:t>
+              </a:r>
+              <a:r>
+                <a:rPr lang="en-US" sz="1100" dirty="0"/>
+                <a:t> </a:t>
+              </a:r>
+              <a:r>
+                <a:rPr lang="fa-IR" sz="1100" dirty="0"/>
+                <a:t>متن </a:t>
+              </a:r>
+              <a:r>
+                <a:rPr lang="fa-IR" sz="1100" dirty="0" smtClean="0"/>
+                <a:t>متن متن </a:t>
+              </a:r>
+              <a:r>
+                <a:rPr lang="fa-IR" sz="1100" dirty="0" smtClean="0">
+                  <a:latin typeface="XB Kayhan" panose="02000503080000020003" pitchFamily="2" charset="-78"/>
+                  <a:cs typeface="XB Kayhan" panose="02000503080000020003" pitchFamily="2" charset="-78"/>
+                </a:rPr>
+                <a:t>آزمایشی </a:t>
+              </a:r>
+              <a:r>
+                <a:rPr lang="fa-IR" sz="1100" dirty="0">
+                  <a:latin typeface="XB Kayhan" panose="02000503080000020003" pitchFamily="2" charset="-78"/>
+                  <a:cs typeface="XB Kayhan" panose="02000503080000020003" pitchFamily="2" charset="-78"/>
+                </a:rPr>
+                <a:t>متن </a:t>
+              </a:r>
+              <a:r>
+                <a:rPr lang="fa-IR" sz="1100" dirty="0" smtClean="0">
+                  <a:latin typeface="XB Kayhan" panose="02000503080000020003" pitchFamily="2" charset="-78"/>
+                  <a:cs typeface="XB Kayhan" panose="02000503080000020003" pitchFamily="2" charset="-78"/>
+                </a:rPr>
+                <a:t>آزمایشی</a:t>
+              </a:r>
+              <a:r>
+                <a:rPr lang="fa-IR" sz="1100" dirty="0">
+                  <a:latin typeface="XB Kayhan" panose="02000503080000020003" pitchFamily="2" charset="-78"/>
+                  <a:cs typeface="XB Kayhan" panose="02000503080000020003" pitchFamily="2" charset="-78"/>
+                </a:rPr>
+                <a:t> متن آزمایشی متن </a:t>
+              </a:r>
+              <a:r>
+                <a:rPr lang="fa-IR" sz="1100" dirty="0" smtClean="0">
+                  <a:latin typeface="XB Kayhan" panose="02000503080000020003" pitchFamily="2" charset="-78"/>
+                  <a:cs typeface="XB Kayhan" panose="02000503080000020003" pitchFamily="2" charset="-78"/>
+                </a:rPr>
+                <a:t>آزمایشی</a:t>
+              </a:r>
+              <a:r>
+                <a:rPr lang="fa-IR" sz="1100" dirty="0">
+                  <a:latin typeface="XB Kayhan" panose="02000503080000020003" pitchFamily="2" charset="-78"/>
+                  <a:cs typeface="XB Kayhan" panose="02000503080000020003" pitchFamily="2" charset="-78"/>
+                </a:rPr>
+                <a:t> متن آزمایشی متن </a:t>
+              </a:r>
+              <a:r>
+                <a:rPr lang="fa-IR" sz="1100" dirty="0" smtClean="0">
+                  <a:latin typeface="XB Kayhan" panose="02000503080000020003" pitchFamily="2" charset="-78"/>
+                  <a:cs typeface="XB Kayhan" panose="02000503080000020003" pitchFamily="2" charset="-78"/>
+                </a:rPr>
+                <a:t>آزمایشی</a:t>
+              </a:r>
+              <a:r>
+                <a:rPr lang="fa-IR" sz="1100" dirty="0">
+                  <a:latin typeface="XB Kayhan" panose="02000503080000020003" pitchFamily="2" charset="-78"/>
+                  <a:cs typeface="XB Kayhan" panose="02000503080000020003" pitchFamily="2" charset="-78"/>
+                </a:rPr>
+                <a:t> متن آزمایشی متن </a:t>
+              </a:r>
+              <a:r>
+                <a:rPr lang="fa-IR" sz="1100" dirty="0" smtClean="0">
+                  <a:latin typeface="XB Kayhan" panose="02000503080000020003" pitchFamily="2" charset="-78"/>
+                  <a:cs typeface="XB Kayhan" panose="02000503080000020003" pitchFamily="2" charset="-78"/>
+                </a:rPr>
+                <a:t>آزمایشی</a:t>
+              </a:r>
+              <a:r>
+                <a:rPr lang="fa-IR" sz="1100" dirty="0">
+                  <a:latin typeface="XB Kayhan" panose="02000503080000020003" pitchFamily="2" charset="-78"/>
+                  <a:cs typeface="XB Kayhan" panose="02000503080000020003" pitchFamily="2" charset="-78"/>
+                </a:rPr>
+                <a:t> متن آزمایشی متن </a:t>
+              </a:r>
+              <a:r>
+                <a:rPr lang="fa-IR" sz="1100" dirty="0" smtClean="0">
+                  <a:latin typeface="XB Kayhan" panose="02000503080000020003" pitchFamily="2" charset="-78"/>
+                  <a:cs typeface="XB Kayhan" panose="02000503080000020003" pitchFamily="2" charset="-78"/>
+                </a:rPr>
+                <a:t>آزمایشی</a:t>
+              </a:r>
+              <a:r>
+                <a:rPr lang="fa-IR" sz="1100" dirty="0">
+                  <a:latin typeface="XB Kayhan" panose="02000503080000020003" pitchFamily="2" charset="-78"/>
+                  <a:cs typeface="XB Kayhan" panose="02000503080000020003" pitchFamily="2" charset="-78"/>
+                </a:rPr>
+                <a:t> متن آزمایشی متن </a:t>
+              </a:r>
+              <a:r>
+                <a:rPr lang="fa-IR" sz="1100" dirty="0" smtClean="0">
+                  <a:latin typeface="XB Kayhan" panose="02000503080000020003" pitchFamily="2" charset="-78"/>
+                  <a:cs typeface="XB Kayhan" panose="02000503080000020003" pitchFamily="2" charset="-78"/>
+                </a:rPr>
+                <a:t>آزمایشی</a:t>
+              </a:r>
+              <a:r>
+                <a:rPr lang="fa-IR" sz="1100" dirty="0">
+                  <a:latin typeface="XB Kayhan" panose="02000503080000020003" pitchFamily="2" charset="-78"/>
+                  <a:cs typeface="XB Kayhan" panose="02000503080000020003" pitchFamily="2" charset="-78"/>
+                </a:rPr>
+                <a:t> متن </a:t>
+              </a:r>
+            </a:p>
+          </p:txBody>
+        </p:sp>
+      </p:grpSp>
+      <p:grpSp>
+        <p:nvGrpSpPr>
+          <p:cNvPr id="48" name="Group 47"/>
+          <p:cNvGrpSpPr/>
+          <p:nvPr/>
+        </p:nvGrpSpPr>
+        <p:grpSpPr>
+          <a:xfrm>
+            <a:off x="247186" y="7910681"/>
+            <a:ext cx="3147060" cy="1715638"/>
+            <a:chOff x="228600" y="5845235"/>
+            <a:chExt cx="3147060" cy="1736853"/>
+          </a:xfrm>
+        </p:grpSpPr>
+        <p:sp>
+          <p:nvSpPr>
+            <p:cNvPr id="49" name="Rounded Rectangle 48"/>
+            <p:cNvSpPr/>
+            <p:nvPr/>
+          </p:nvSpPr>
+          <p:spPr>
+            <a:xfrm>
+              <a:off x="228600" y="5845235"/>
+              <a:ext cx="3147060" cy="1736853"/>
+            </a:xfrm>
+            <a:prstGeom prst="roundRect">
+              <a:avLst>
+                <a:gd name="adj" fmla="val 6909"/>
+              </a:avLst>
+            </a:prstGeom>
+            <a:solidFill>
+              <a:schemeClr val="accent3">
+                <a:lumMod val="20000"/>
+                <a:lumOff val="80000"/>
+              </a:schemeClr>
+            </a:solidFill>
+            <a:ln w="19050">
+              <a:solidFill>
+                <a:srgbClr val="C00000"/>
+              </a:solidFill>
+            </a:ln>
+          </p:spPr>
+          <p:style>
+            <a:lnRef idx="2">
+              <a:schemeClr val="accent1">
+                <a:shade val="50000"/>
+              </a:schemeClr>
+            </a:lnRef>
+            <a:fillRef idx="1">
+              <a:schemeClr val="accent1"/>
+            </a:fillRef>
+            <a:effectRef idx="0">
+              <a:schemeClr val="accent1"/>
+            </a:effectRef>
+            <a:fontRef idx="minor">
+              <a:schemeClr val="lt1"/>
+            </a:fontRef>
+          </p:style>
+          <p:txBody>
+            <a:bodyPr rtlCol="0" anchor="ctr"/>
+            <a:lstStyle/>
+            <a:p>
+              <a:pPr algn="ctr"/>
+              <a:endParaRPr lang="en-US"/>
+            </a:p>
+          </p:txBody>
+        </p:sp>
+        <p:sp>
+          <p:nvSpPr>
+            <p:cNvPr id="50" name="TextBox 49"/>
+            <p:cNvSpPr txBox="1"/>
+            <p:nvPr/>
+          </p:nvSpPr>
+          <p:spPr>
+            <a:xfrm>
+              <a:off x="315211" y="5917365"/>
+              <a:ext cx="2954399" cy="405058"/>
+            </a:xfrm>
+            <a:prstGeom prst="rect">
+              <a:avLst/>
+            </a:prstGeom>
+            <a:noFill/>
+            <a:ln>
+              <a:noFill/>
+            </a:ln>
+          </p:spPr>
+          <p:txBody>
+            <a:bodyPr wrap="square" rtlCol="0">
+              <a:spAutoFit/>
+            </a:bodyPr>
+            <a:lstStyle/>
+            <a:p>
+              <a:pPr algn="r" rtl="1"/>
+              <a:endParaRPr lang="en-US" sz="100" b="1" dirty="0" smtClean="0">
+                <a:latin typeface="XB Kayhan" panose="02000503080000020003" pitchFamily="2" charset="-78"/>
+                <a:cs typeface="XB Kayhan" panose="02000503080000020003" pitchFamily="2" charset="-78"/>
+              </a:endParaRPr>
+            </a:p>
+            <a:p>
+              <a:pPr algn="r" rtl="1"/>
+              <a:endParaRPr lang="en-US" sz="100" b="1" dirty="0" smtClean="0">
+                <a:latin typeface="XB Kayhan" panose="02000503080000020003" pitchFamily="2" charset="-78"/>
+                <a:cs typeface="XB Kayhan" panose="02000503080000020003" pitchFamily="2" charset="-78"/>
+              </a:endParaRPr>
+            </a:p>
+            <a:p>
+              <a:pPr algn="r" rtl="1"/>
+              <a:endParaRPr lang="en-US" sz="100" b="1" dirty="0" smtClean="0">
+                <a:latin typeface="XB Kayhan" panose="02000503080000020003" pitchFamily="2" charset="-78"/>
+                <a:cs typeface="XB Kayhan" panose="02000503080000020003" pitchFamily="2" charset="-78"/>
+              </a:endParaRPr>
+            </a:p>
+            <a:p>
+              <a:pPr algn="r" rtl="1"/>
+              <a:endParaRPr lang="en-US" sz="100" b="1" dirty="0" smtClean="0">
+                <a:latin typeface="XB Kayhan" panose="02000503080000020003" pitchFamily="2" charset="-78"/>
+                <a:cs typeface="XB Kayhan" panose="02000503080000020003" pitchFamily="2" charset="-78"/>
+              </a:endParaRPr>
+            </a:p>
+            <a:p>
+              <a:pPr algn="r" rtl="1"/>
+              <a:endParaRPr lang="en-US" sz="100" b="1" dirty="0" smtClean="0">
+                <a:latin typeface="XB Kayhan" panose="02000503080000020003" pitchFamily="2" charset="-78"/>
+                <a:cs typeface="XB Kayhan" panose="02000503080000020003" pitchFamily="2" charset="-78"/>
+              </a:endParaRPr>
+            </a:p>
+            <a:p>
+              <a:pPr algn="r" rtl="1"/>
+              <a:r>
+                <a:rPr lang="ar-SA" sz="1400" b="1" dirty="0" smtClean="0">
+                  <a:cs typeface="B Lotus" panose="00000400000000000000" pitchFamily="2" charset="-78"/>
+                </a:rPr>
+                <a:t>عنوان </a:t>
+              </a:r>
+              <a:r>
+                <a:rPr lang="fa-IR" sz="1400" b="1" dirty="0" smtClean="0">
+                  <a:cs typeface="B Lotus" panose="00000400000000000000" pitchFamily="2" charset="-78"/>
+                </a:rPr>
+                <a:t>بخش</a:t>
+              </a:r>
+              <a:r>
+                <a:rPr lang="ar-SA" sz="1400" b="1" dirty="0" smtClean="0">
+                  <a:cs typeface="B Lotus" panose="00000400000000000000" pitchFamily="2" charset="-78"/>
+                </a:rPr>
+                <a:t> عنوان مقاله (</a:t>
+              </a:r>
+              <a:r>
+                <a:rPr lang="en-US" sz="1400" b="1" dirty="0" smtClean="0">
+                  <a:cs typeface="B Lotus" panose="00000400000000000000" pitchFamily="2" charset="-78"/>
+                </a:rPr>
+                <a:t>B Lotus 14</a:t>
+              </a:r>
+              <a:r>
+                <a:rPr lang="ar-SA" sz="1400" b="1" dirty="0" smtClean="0">
+                  <a:cs typeface="B Lotus" panose="00000400000000000000" pitchFamily="2" charset="-78"/>
+                </a:rPr>
+                <a:t>پررنگ)</a:t>
+              </a:r>
+              <a:endParaRPr lang="en-US" sz="1400" b="1" dirty="0" smtClean="0">
+                <a:cs typeface="B Lotus" panose="00000400000000000000" pitchFamily="2" charset="-78"/>
+              </a:endParaRPr>
+            </a:p>
+            <a:p>
+              <a:pPr algn="r" rtl="1"/>
+              <a:endParaRPr lang="en-US" sz="100" b="1" dirty="0" smtClean="0">
+                <a:latin typeface="XB Kayhan" panose="02000503080000020003" pitchFamily="2" charset="-78"/>
+                <a:cs typeface="XB Kayhan" panose="02000503080000020003" pitchFamily="2" charset="-78"/>
+              </a:endParaRPr>
             </a:p>
           </p:txBody>
         </p:sp>
@@ -4076,182 +5286,7 @@
         </p:blipFill>
         <p:spPr>
           <a:xfrm>
-            <a:off x="4721073" y="8225372"/>
-            <a:ext cx="640080" cy="640080"/>
-          </a:xfrm>
-          <a:prstGeom prst="rect">
-            <a:avLst/>
-          </a:prstGeom>
-        </p:spPr>
-      </p:pic>
-      <p:pic>
-        <p:nvPicPr>
-          <p:cNvPr id="3" name="Picture 2"/>
-          <p:cNvPicPr>
-            <a:picLocks noChangeAspect="1"/>
-          </p:cNvPicPr>
-          <p:nvPr/>
-        </p:nvPicPr>
-        <p:blipFill>
-          <a:blip r:embed="rId5">
-            <a:extLst>
-              <a:ext uri="{28A0092B-C50C-407E-A947-70E740481C1C}">
-                <a14:useLocalDpi xmlns:a14="http://schemas.microsoft.com/office/drawing/2010/main" val="0"/>
-              </a:ext>
-            </a:extLst>
-          </a:blip>
-          <a:stretch>
-            <a:fillRect/>
-          </a:stretch>
-        </p:blipFill>
-        <p:spPr>
-          <a:xfrm>
-            <a:off x="5393302" y="342867"/>
-            <a:ext cx="1236097" cy="1236097"/>
-          </a:xfrm>
-          <a:prstGeom prst="rect">
-            <a:avLst/>
-          </a:prstGeom>
-        </p:spPr>
-      </p:pic>
-      <p:sp>
-        <p:nvSpPr>
-          <p:cNvPr id="24" name="TextBox 23"/>
-          <p:cNvSpPr txBox="1"/>
-          <p:nvPr/>
-        </p:nvSpPr>
-        <p:spPr>
-          <a:xfrm>
-            <a:off x="3587750" y="7521665"/>
-            <a:ext cx="3041336" cy="646331"/>
-          </a:xfrm>
-          <a:prstGeom prst="rect">
-            <a:avLst/>
-          </a:prstGeom>
-          <a:noFill/>
-        </p:spPr>
-        <p:txBody>
-          <a:bodyPr wrap="square" rtlCol="0">
-            <a:spAutoFit/>
-          </a:bodyPr>
-          <a:lstStyle/>
-          <a:p>
-            <a:pPr marL="114300" indent="-114300" algn="r" rtl="1">
-              <a:buFont typeface="Arial" panose="020B0604020202020204" pitchFamily="34" charset="0"/>
-              <a:buChar char="•"/>
-            </a:pPr>
-            <a:r>
-              <a:rPr lang="fa-IR" sz="1200" dirty="0">
-                <a:latin typeface="XB Kayhan" panose="02000503080000020003" pitchFamily="2" charset="-78"/>
-                <a:cs typeface="XB Kayhan" panose="02000503080000020003" pitchFamily="2" charset="-78"/>
-              </a:rPr>
-              <a:t>برای گرفتن اطلاعات </a:t>
-            </a:r>
-            <a:r>
-              <a:rPr lang="fa-IR" sz="1200" dirty="0" smtClean="0">
-                <a:latin typeface="XB Kayhan" panose="02000503080000020003" pitchFamily="2" charset="-78"/>
-                <a:cs typeface="XB Kayhan" panose="02000503080000020003" pitchFamily="2" charset="-78"/>
-              </a:rPr>
-              <a:t>بیشتر به صفحه وب گردهمایی مراجعه نمایید.</a:t>
-            </a:r>
-            <a:endParaRPr lang="en-US" sz="1200" dirty="0">
-              <a:latin typeface="XB Kayhan" panose="02000503080000020003" pitchFamily="2" charset="-78"/>
-              <a:cs typeface="XB Kayhan" panose="02000503080000020003" pitchFamily="2" charset="-78"/>
-            </a:endParaRPr>
-          </a:p>
-          <a:p>
-            <a:pPr algn="ctr"/>
-            <a:r>
-              <a:rPr lang="en-US" sz="1100" b="1" dirty="0" smtClean="0"/>
-              <a:t>https</a:t>
-            </a:r>
-            <a:r>
-              <a:rPr lang="en-US" sz="1100" b="1" dirty="0"/>
-              <a:t>://iasbs.ac.ir/~</a:t>
-            </a:r>
-            <a:r>
-              <a:rPr lang="en-US" sz="1100" b="1" dirty="0" smtClean="0"/>
-              <a:t>condmat-meeting/m26</a:t>
-            </a:r>
-            <a:endParaRPr lang="fa-IR" sz="1100" b="1" dirty="0" smtClean="0"/>
-          </a:p>
-        </p:txBody>
-      </p:sp>
-      <p:sp>
-        <p:nvSpPr>
-          <p:cNvPr id="28" name="TextBox 27"/>
-          <p:cNvSpPr txBox="1"/>
-          <p:nvPr/>
-        </p:nvSpPr>
-        <p:spPr>
-          <a:xfrm>
-            <a:off x="232163" y="7521665"/>
-            <a:ext cx="3052057" cy="630942"/>
-          </a:xfrm>
-          <a:prstGeom prst="rect">
-            <a:avLst/>
-          </a:prstGeom>
-          <a:noFill/>
-        </p:spPr>
-        <p:txBody>
-          <a:bodyPr wrap="square" rtlCol="0">
-            <a:spAutoFit/>
-          </a:bodyPr>
-          <a:lstStyle/>
-          <a:p>
-            <a:pPr marL="114300" indent="-114300" algn="r" rtl="1">
-              <a:buFont typeface="Arial" panose="020B0604020202020204" pitchFamily="34" charset="0"/>
-              <a:buChar char="•"/>
-            </a:pPr>
-            <a:r>
-              <a:rPr lang="fa-IR" sz="1200" dirty="0" smtClean="0">
-                <a:latin typeface="XB Kayhan" panose="02000503080000020003" pitchFamily="2" charset="-78"/>
-                <a:cs typeface="XB Kayhan" panose="02000503080000020003" pitchFamily="2" charset="-78"/>
-              </a:rPr>
-              <a:t>برای ثبت نام و ارسال چکیده مقاله به صفحه ثبت‌نام مراجعه نمایید.</a:t>
-            </a:r>
-            <a:endParaRPr lang="en-US" sz="1200" dirty="0" smtClean="0">
-              <a:latin typeface="XB Kayhan" panose="02000503080000020003" pitchFamily="2" charset="-78"/>
-              <a:cs typeface="XB Kayhan" panose="02000503080000020003" pitchFamily="2" charset="-78"/>
-            </a:endParaRPr>
-          </a:p>
-          <a:p>
-            <a:pPr algn="ctr"/>
-            <a:r>
-              <a:rPr lang="en-US" sz="1100" b="1" dirty="0" smtClean="0"/>
-              <a:t> http</a:t>
-            </a:r>
-            <a:r>
-              <a:rPr lang="en-US" sz="1100" b="1" dirty="0"/>
-              <a:t>://www.psi.ir/f/meeting.cm26</a:t>
-            </a:r>
-            <a:endParaRPr lang="fa-IR" sz="1100" b="1" dirty="0" smtClean="0"/>
-          </a:p>
-        </p:txBody>
-      </p:sp>
-      <p:pic>
-        <p:nvPicPr>
-          <p:cNvPr id="7" name="Picture 6"/>
-          <p:cNvPicPr>
-            <a:picLocks noChangeAspect="1"/>
-          </p:cNvPicPr>
-          <p:nvPr/>
-        </p:nvPicPr>
-        <p:blipFill>
-          <a:blip r:embed="rId6" cstate="print">
-            <a:extLst>
-              <a:ext uri="{28A0092B-C50C-407E-A947-70E740481C1C}">
-                <a14:useLocalDpi xmlns:a14="http://schemas.microsoft.com/office/drawing/2010/main" val="0"/>
-              </a:ext>
-            </a:extLst>
-          </a:blip>
-          <a:stretch>
-            <a:fillRect/>
-          </a:stretch>
-        </p:blipFill>
-        <p:spPr>
-          <a:xfrm>
-            <a:off x="1489709" y="8225372"/>
+            <a:off x="1472536" y="8434742"/>
             <a:ext cx="640080" cy="640080"/>
           </a:xfrm>
           <a:prstGeom prst="rect">

</xml_diff>